<commit_message>
real1 AutoAdaptativo Porcentagem e Sigma
</commit_message>
<xml_diff>
--- a/abordagems_autoadaptativas.pptx
+++ b/abordagems_autoadaptativas.pptx
@@ -5,13 +5,17 @@
     <p:sldMasterId id="2147483648" r:id="rId1"/>
   </p:sldMasterIdLst>
   <p:notesMasterIdLst>
-    <p:notesMasterId r:id="rId4"/>
+    <p:notesMasterId r:id="rId8"/>
   </p:notesMasterIdLst>
   <p:handoutMasterIdLst>
-    <p:handoutMasterId r:id="rId5"/>
+    <p:handoutMasterId r:id="rId9"/>
   </p:handoutMasterIdLst>
   <p:sldIdLst>
     <p:sldId id="257" r:id="rId3"/>
+    <p:sldId id="259" r:id="rId4"/>
+    <p:sldId id="260" r:id="rId5"/>
+    <p:sldId id="261" r:id="rId6"/>
+    <p:sldId id="258" r:id="rId7"/>
   </p:sldIdLst>
   <p:sldSz cx="12192000" cy="6858000"/>
   <p:notesSz cx="7103745" cy="10234295"/>
@@ -4786,6 +4790,3834 @@
 </p:sld>
 </file>
 
+<file path=ppt/slides/slide2.xml><?xml version="1.0" encoding="utf-8"?>
+<p:sld xmlns:a="http://schemas.openxmlformats.org/drawingml/2006/main" xmlns:r="http://schemas.openxmlformats.org/officeDocument/2006/relationships" xmlns:p="http://schemas.openxmlformats.org/presentationml/2006/main">
+  <p:cSld>
+    <p:spTree>
+      <p:nvGrpSpPr>
+        <p:cNvPr id="1" name=""/>
+        <p:cNvGrpSpPr/>
+        <p:nvPr/>
+      </p:nvGrpSpPr>
+      <p:grpSpPr/>
+      <p:grpSp>
+        <p:nvGrpSpPr>
+          <p:cNvPr id="5" name="Group 4"/>
+          <p:cNvGrpSpPr/>
+          <p:nvPr/>
+        </p:nvGrpSpPr>
+        <p:grpSpPr>
+          <a:xfrm>
+            <a:off x="2988310" y="286385"/>
+            <a:ext cx="6216015" cy="2600325"/>
+            <a:chOff x="4706" y="451"/>
+            <a:chExt cx="9789" cy="4095"/>
+          </a:xfrm>
+        </p:grpSpPr>
+        <mc:AlternateContent xmlns:mc="http://schemas.openxmlformats.org/markup-compatibility/2006">
+          <mc:Choice xmlns:a14="http://schemas.microsoft.com/office/drawing/2010/main" Requires="a14">
+            <p:sp>
+              <p:nvSpPr>
+                <p:cNvPr id="27" name="Text Box 26"/>
+                <p:cNvSpPr txBox="1"/>
+                <p:nvPr/>
+              </p:nvSpPr>
+              <p:spPr>
+                <a:xfrm>
+                  <a:off x="4706" y="1322"/>
+                  <a:ext cx="9789" cy="3224"/>
+                </a:xfrm>
+                <a:prstGeom prst="rect">
+                  <a:avLst/>
+                </a:prstGeom>
+                <a:noFill/>
+              </p:spPr>
+              <p:txBody>
+                <a:bodyPr wrap="square" rtlCol="0">
+                  <a:spAutoFit/>
+                </a:bodyPr>
+                <a:p>
+                  <a:pPr lvl="0" indent="0" algn="just">
+                    <a:lnSpc>
+                      <a:spcPct val="150000"/>
+                    </a:lnSpc>
+                    <a:buFont typeface="Arial" panose="020B0604020202020204" pitchFamily="34" charset="0"/>
+                    <a:buNone/>
+                  </a:pPr>
+                  <a:r>
+                    <a:rPr lang="pt-PT" altLang="en-US" sz="1600">
+                      <a:solidFill>
+                        <a:srgbClr val="C00000"/>
+                      </a:solidFill>
+                      <a:cs typeface="+mn-lt"/>
+                      <a:sym typeface="+mn-ea"/>
+                    </a:rPr>
+                    <a:t>Para calcular a adaptabilidade do </a:t>
+                  </a:r>
+                  <a14:m>
+                    <m:oMath xmlns:m="http://schemas.openxmlformats.org/officeDocument/2006/math">
+                      <m:sSup>
+                        <m:sSupPr>
+                          <m:ctrlPr>
+                            <a:rPr lang="en-US" sz="1600" i="1">
+                              <a:solidFill>
+                                <a:srgbClr val="C00000"/>
+                              </a:solidFill>
+                              <a:latin typeface="DejaVu Math TeX Gyre" panose="02000503000000000000" charset="0"/>
+                              <a:cs typeface="DejaVu Math TeX Gyre" panose="02000503000000000000" charset="0"/>
+                            </a:rPr>
+                          </m:ctrlPr>
+                        </m:sSupPr>
+                        <m:e>
+                          <m:r>
+                            <a:rPr lang="en-US" sz="1600" i="1">
+                              <a:solidFill>
+                                <a:srgbClr val="C00000"/>
+                              </a:solidFill>
+                              <a:latin typeface="DejaVu Math TeX Gyre" panose="02000503000000000000" charset="0"/>
+                              <a:ea typeface="MS Mincho" charset="0"/>
+                              <a:cs typeface="DejaVu Math TeX Gyre" panose="02000503000000000000" charset="0"/>
+                            </a:rPr>
+                            <m:t>𝜎</m:t>
+                          </m:r>
+                        </m:e>
+                        <m:sup>
+                          <m:r>
+                            <a:rPr lang="en-US" sz="1600" i="1">
+                              <a:solidFill>
+                                <a:srgbClr val="C00000"/>
+                              </a:solidFill>
+                              <a:latin typeface="DejaVu Math TeX Gyre" panose="02000503000000000000" charset="0"/>
+                              <a:ea typeface="MS Mincho" charset="0"/>
+                              <a:cs typeface="DejaVu Math TeX Gyre" panose="02000503000000000000" charset="0"/>
+                            </a:rPr>
+                            <m:t>’</m:t>
+                          </m:r>
+                        </m:sup>
+                      </m:sSup>
+                    </m:oMath>
+                  </a14:m>
+                  <a:r>
+                    <a:rPr lang="pt-PT" altLang="en-US" sz="1600">
+                      <a:solidFill>
+                        <a:srgbClr val="C00000"/>
+                      </a:solidFill>
+                      <a:cs typeface="+mn-lt"/>
+                      <a:sym typeface="+mn-ea"/>
+                    </a:rPr>
+                    <a:t>, perturba todas as variáveis de uma só vez com </a:t>
+                  </a:r>
+                  <a14:m>
+                    <m:oMath xmlns:m="http://schemas.openxmlformats.org/officeDocument/2006/math">
+                      <m:sSubSup>
+                        <m:sSubSupPr>
+                          <m:ctrlPr>
+                            <a:rPr lang="en-US" sz="1600" i="1">
+                              <a:solidFill>
+                                <a:srgbClr val="C00000"/>
+                              </a:solidFill>
+                              <a:latin typeface="DejaVu Math TeX Gyre" panose="02000503000000000000" charset="0"/>
+                              <a:cs typeface="DejaVu Math TeX Gyre" panose="02000503000000000000" charset="0"/>
+                            </a:rPr>
+                          </m:ctrlPr>
+                        </m:sSubSupPr>
+                        <m:e>
+                          <m:r>
+                            <a:rPr lang="en-US" sz="1600" i="1">
+                              <a:solidFill>
+                                <a:srgbClr val="C00000"/>
+                              </a:solidFill>
+                              <a:latin typeface="DejaVu Math TeX Gyre" panose="02000503000000000000" charset="0"/>
+                              <a:cs typeface="DejaVu Math TeX Gyre" panose="02000503000000000000" charset="0"/>
+                            </a:rPr>
+                            <m:t>𝑥</m:t>
+                          </m:r>
+                        </m:e>
+                        <m:sub>
+                          <m:r>
+                            <a:rPr lang="en-US" sz="1600" i="1">
+                              <a:solidFill>
+                                <a:srgbClr val="C00000"/>
+                              </a:solidFill>
+                              <a:latin typeface="DejaVu Math TeX Gyre" panose="02000503000000000000" charset="0"/>
+                              <a:cs typeface="DejaVu Math TeX Gyre" panose="02000503000000000000" charset="0"/>
+                            </a:rPr>
+                            <m:t>𝑖</m:t>
+                          </m:r>
+                        </m:sub>
+                        <m:sup>
+                          <m:r>
+                            <a:rPr lang="en-US" sz="1600" i="1">
+                              <a:solidFill>
+                                <a:srgbClr val="C00000"/>
+                              </a:solidFill>
+                              <a:latin typeface="DejaVu Math TeX Gyre" panose="02000503000000000000" charset="0"/>
+                              <a:ea typeface="MS Mincho" charset="0"/>
+                              <a:cs typeface="DejaVu Math TeX Gyre" panose="02000503000000000000" charset="0"/>
+                            </a:rPr>
+                            <m:t>’</m:t>
+                          </m:r>
+                        </m:sup>
+                      </m:sSubSup>
+                      <m:r>
+                        <a:rPr lang="en-US" sz="1600" i="1">
+                          <a:solidFill>
+                            <a:srgbClr val="C00000"/>
+                          </a:solidFill>
+                          <a:latin typeface="DejaVu Math TeX Gyre" panose="02000503000000000000" charset="0"/>
+                          <a:ea typeface="MS Mincho" charset="0"/>
+                          <a:cs typeface="DejaVu Math TeX Gyre" panose="02000503000000000000" charset="0"/>
+                        </a:rPr>
+                        <m:t>=</m:t>
+                      </m:r>
+                      <m:sSub>
+                        <m:sSubPr>
+                          <m:ctrlPr>
+                            <a:rPr lang="en-US" sz="1600" i="1">
+                              <a:solidFill>
+                                <a:srgbClr val="C00000"/>
+                              </a:solidFill>
+                              <a:latin typeface="DejaVu Math TeX Gyre" panose="02000503000000000000" charset="0"/>
+                              <a:cs typeface="DejaVu Math TeX Gyre" panose="02000503000000000000" charset="0"/>
+                            </a:rPr>
+                          </m:ctrlPr>
+                        </m:sSubPr>
+                        <m:e>
+                          <m:r>
+                            <a:rPr lang="en-US" sz="1600" i="1">
+                              <a:solidFill>
+                                <a:srgbClr val="C00000"/>
+                              </a:solidFill>
+                              <a:latin typeface="DejaVu Math TeX Gyre" panose="02000503000000000000" charset="0"/>
+                              <a:cs typeface="DejaVu Math TeX Gyre" panose="02000503000000000000" charset="0"/>
+                            </a:rPr>
+                            <m:t>𝑥</m:t>
+                          </m:r>
+                        </m:e>
+                        <m:sub>
+                          <m:r>
+                            <a:rPr lang="en-US" sz="1600" i="1">
+                              <a:solidFill>
+                                <a:srgbClr val="C00000"/>
+                              </a:solidFill>
+                              <a:latin typeface="DejaVu Math TeX Gyre" panose="02000503000000000000" charset="0"/>
+                              <a:cs typeface="DejaVu Math TeX Gyre" panose="02000503000000000000" charset="0"/>
+                            </a:rPr>
+                            <m:t>𝑖</m:t>
+                          </m:r>
+                        </m:sub>
+                      </m:sSub>
+                      <m:r>
+                        <a:rPr lang="en-US" sz="1600" i="1">
+                          <a:solidFill>
+                            <a:srgbClr val="C00000"/>
+                          </a:solidFill>
+                          <a:latin typeface="DejaVu Math TeX Gyre" panose="02000503000000000000" charset="0"/>
+                          <a:ea typeface="MS Mincho" charset="0"/>
+                          <a:cs typeface="DejaVu Math TeX Gyre" panose="02000503000000000000" charset="0"/>
+                        </a:rPr>
+                        <m:t>+</m:t>
+                      </m:r>
+                      <m:r>
+                        <a:rPr lang="en-US" sz="1600" i="1">
+                          <a:solidFill>
+                            <a:srgbClr val="C00000"/>
+                          </a:solidFill>
+                          <a:latin typeface="DejaVu Math TeX Gyre" panose="02000503000000000000" charset="0"/>
+                          <a:cs typeface="DejaVu Math TeX Gyre" panose="02000503000000000000" charset="0"/>
+                        </a:rPr>
+                        <m:t>𝑁</m:t>
+                      </m:r>
+                      <m:r>
+                        <a:rPr lang="en-US" sz="1600" i="1">
+                          <a:solidFill>
+                            <a:srgbClr val="C00000"/>
+                          </a:solidFill>
+                          <a:latin typeface="DejaVu Math TeX Gyre" panose="02000503000000000000" charset="0"/>
+                          <a:ea typeface="MS Mincho" charset="0"/>
+                          <a:cs typeface="DejaVu Math TeX Gyre" panose="02000503000000000000" charset="0"/>
+                        </a:rPr>
+                        <m:t>(</m:t>
+                      </m:r>
+                      <m:r>
+                        <a:rPr lang="en-US" sz="1600" i="1">
+                          <a:solidFill>
+                            <a:srgbClr val="C00000"/>
+                          </a:solidFill>
+                          <a:latin typeface="DejaVu Math TeX Gyre" panose="02000503000000000000" charset="0"/>
+                          <a:ea typeface="MS Mincho" charset="0"/>
+                          <a:cs typeface="DejaVu Math TeX Gyre" panose="02000503000000000000" charset="0"/>
+                        </a:rPr>
+                        <m:t>0</m:t>
+                      </m:r>
+                      <m:r>
+                        <a:rPr lang="en-US" sz="1600" i="1">
+                          <a:solidFill>
+                            <a:srgbClr val="C00000"/>
+                          </a:solidFill>
+                          <a:latin typeface="DejaVu Math TeX Gyre" panose="02000503000000000000" charset="0"/>
+                          <a:ea typeface="MS Mincho" charset="0"/>
+                          <a:cs typeface="DejaVu Math TeX Gyre" panose="02000503000000000000" charset="0"/>
+                        </a:rPr>
+                        <m:t>,</m:t>
+                      </m:r>
+                      <m:sSup>
+                        <m:sSupPr>
+                          <m:ctrlPr>
+                            <a:rPr lang="en-US" sz="1600" i="1">
+                              <a:solidFill>
+                                <a:srgbClr val="C00000"/>
+                              </a:solidFill>
+                              <a:latin typeface="DejaVu Math TeX Gyre" panose="02000503000000000000" charset="0"/>
+                              <a:cs typeface="DejaVu Math TeX Gyre" panose="02000503000000000000" charset="0"/>
+                            </a:rPr>
+                          </m:ctrlPr>
+                        </m:sSupPr>
+                        <m:e>
+                          <m:r>
+                            <a:rPr lang="en-US" sz="1600" i="1">
+                              <a:solidFill>
+                                <a:srgbClr val="C00000"/>
+                              </a:solidFill>
+                              <a:latin typeface="DejaVu Math TeX Gyre" panose="02000503000000000000" charset="0"/>
+                              <a:ea typeface="MS Mincho" charset="0"/>
+                              <a:cs typeface="DejaVu Math TeX Gyre" panose="02000503000000000000" charset="0"/>
+                            </a:rPr>
+                            <m:t>𝜎</m:t>
+                          </m:r>
+                        </m:e>
+                        <m:sup>
+                          <m:r>
+                            <a:rPr lang="en-US" sz="1600" i="1">
+                              <a:solidFill>
+                                <a:srgbClr val="C00000"/>
+                              </a:solidFill>
+                              <a:latin typeface="DejaVu Math TeX Gyre" panose="02000503000000000000" charset="0"/>
+                              <a:ea typeface="MS Mincho" charset="0"/>
+                              <a:cs typeface="DejaVu Math TeX Gyre" panose="02000503000000000000" charset="0"/>
+                            </a:rPr>
+                            <m:t>’</m:t>
+                          </m:r>
+                        </m:sup>
+                      </m:sSup>
+                      <m:r>
+                        <a:rPr lang="en-US" sz="1600" i="1">
+                          <a:solidFill>
+                            <a:srgbClr val="C00000"/>
+                          </a:solidFill>
+                          <a:latin typeface="DejaVu Math TeX Gyre" panose="02000503000000000000" charset="0"/>
+                          <a:ea typeface="MS Mincho" charset="0"/>
+                          <a:cs typeface="DejaVu Math TeX Gyre" panose="02000503000000000000" charset="0"/>
+                        </a:rPr>
+                        <m:t>)</m:t>
+                      </m:r>
+                    </m:oMath>
+                  </a14:m>
+                  <a:r>
+                    <a:rPr lang="pt-PT" altLang="en-US" sz="1600">
+                      <a:solidFill>
+                        <a:srgbClr val="C00000"/>
+                      </a:solidFill>
+                      <a:cs typeface="+mn-lt"/>
+                      <a:sym typeface="+mn-ea"/>
+                    </a:rPr>
+                    <a:t> e calcula o valor de f(x).</a:t>
+                  </a:r>
+                  <a:endParaRPr lang="pt-PT" altLang="en-US" sz="1600">
+                    <a:solidFill>
+                      <a:srgbClr val="C00000"/>
+                    </a:solidFill>
+                    <a:cs typeface="+mn-lt"/>
+                    <a:sym typeface="+mn-ea"/>
+                  </a:endParaRPr>
+                </a:p>
+                <a:p>
+                  <a:pPr marL="285750" lvl="0" indent="-285750" algn="just">
+                    <a:lnSpc>
+                      <a:spcPct val="150000"/>
+                    </a:lnSpc>
+                    <a:buFont typeface="Arial" panose="020B0604020202020204" pitchFamily="34" charset="0"/>
+                    <a:buChar char="•"/>
+                  </a:pPr>
+                  <a:endParaRPr lang="pt-PT" altLang="en-US" sz="1600">
+                    <a:cs typeface="+mn-lt"/>
+                    <a:sym typeface="+mn-ea"/>
+                  </a:endParaRPr>
+                </a:p>
+                <a:p>
+                  <a:pPr lvl="0" indent="0" algn="just">
+                    <a:lnSpc>
+                      <a:spcPct val="150000"/>
+                    </a:lnSpc>
+                    <a:buFont typeface="Arial" panose="020B0604020202020204" pitchFamily="34" charset="0"/>
+                    <a:buNone/>
+                  </a:pPr>
+                  <a:r>
+                    <a:rPr lang="pt-PT" altLang="en-US" sz="1600">
+                      <a:cs typeface="+mn-lt"/>
+                      <a:sym typeface="+mn-ea"/>
+                    </a:rPr>
+                    <a:t>Em problemas onde os intervalos de variação das variáveis são diferentes, o sigma é diferente, pois </a:t>
+                  </a:r>
+                  <a14:m>
+                    <m:oMath xmlns:m="http://schemas.openxmlformats.org/officeDocument/2006/math">
+                      <m:r>
+                        <a:rPr lang="en-US" altLang="pt-PT" sz="1600" i="1">
+                          <a:latin typeface="DejaVu Math TeX Gyre" panose="02000503000000000000" charset="0"/>
+                          <a:ea typeface="MS Mincho" charset="0"/>
+                          <a:cs typeface="DejaVu Math TeX Gyre" panose="02000503000000000000" charset="0"/>
+                          <a:sym typeface="+mn-ea"/>
+                        </a:rPr>
+                        <m:t>𝜎</m:t>
+                      </m:r>
+                      <m:r>
+                        <a:rPr lang="en-US" altLang="pt-PT" sz="1600" i="1">
+                          <a:latin typeface="DejaVu Math TeX Gyre" panose="02000503000000000000" charset="0"/>
+                          <a:ea typeface="MS Mincho" charset="0"/>
+                          <a:cs typeface="DejaVu Math TeX Gyre" panose="02000503000000000000" charset="0"/>
+                          <a:sym typeface="+mn-ea"/>
+                        </a:rPr>
+                        <m:t>=</m:t>
+                      </m:r>
+                      <m:r>
+                        <a:rPr lang="en-US" altLang="pt-PT" sz="1600" i="1">
+                          <a:latin typeface="DejaVu Math TeX Gyre" panose="02000503000000000000" charset="0"/>
+                          <a:ea typeface="MS Mincho" charset="0"/>
+                          <a:cs typeface="DejaVu Math TeX Gyre" panose="02000503000000000000" charset="0"/>
+                          <a:sym typeface="+mn-ea"/>
+                        </a:rPr>
+                        <m:t>𝜌</m:t>
+                      </m:r>
+                      <m:r>
+                        <a:rPr lang="en-US" altLang="pt-PT" sz="1600" i="1">
+                          <a:latin typeface="DejaVu Math TeX Gyre" panose="02000503000000000000" charset="0"/>
+                          <a:ea typeface="MS Mincho" charset="0"/>
+                          <a:cs typeface="DejaVu Math TeX Gyre" panose="02000503000000000000" charset="0"/>
+                          <a:sym typeface="+mn-ea"/>
+                        </a:rPr>
+                        <m:t>∙(</m:t>
+                      </m:r>
+                      <m:sSup>
+                        <m:sSupPr>
+                          <m:ctrlPr>
+                            <a:rPr lang="en-US" altLang="pt-PT" sz="1600" i="1">
+                              <a:latin typeface="DejaVu Math TeX Gyre" panose="02000503000000000000" charset="0"/>
+                              <a:cs typeface="DejaVu Math TeX Gyre" panose="02000503000000000000" charset="0"/>
+                              <a:sym typeface="+mn-ea"/>
+                            </a:rPr>
+                          </m:ctrlPr>
+                        </m:sSupPr>
+                        <m:e>
+                          <m:r>
+                            <a:rPr lang="en-US" altLang="pt-PT" sz="1600" i="1">
+                              <a:latin typeface="DejaVu Math TeX Gyre" panose="02000503000000000000" charset="0"/>
+                              <a:cs typeface="DejaVu Math TeX Gyre" panose="02000503000000000000" charset="0"/>
+                              <a:sym typeface="+mn-ea"/>
+                            </a:rPr>
+                            <m:t>𝑥</m:t>
+                          </m:r>
+                        </m:e>
+                        <m:sup>
+                          <m:r>
+                            <a:rPr lang="en-US" altLang="pt-PT" sz="1600" i="1">
+                              <a:latin typeface="DejaVu Math TeX Gyre" panose="02000503000000000000" charset="0"/>
+                              <a:cs typeface="DejaVu Math TeX Gyre" panose="02000503000000000000" charset="0"/>
+                              <a:sym typeface="+mn-ea"/>
+                            </a:rPr>
+                            <m:t>𝑈</m:t>
+                          </m:r>
+                        </m:sup>
+                      </m:sSup>
+                      <m:r>
+                        <a:rPr lang="en-US" altLang="pt-PT" sz="1600" i="1">
+                          <a:latin typeface="DejaVu Math TeX Gyre" panose="02000503000000000000" charset="0"/>
+                          <a:cs typeface="DejaVu Math TeX Gyre" panose="02000503000000000000" charset="0"/>
+                          <a:sym typeface="+mn-ea"/>
+                        </a:rPr>
+                        <m:t>−</m:t>
+                      </m:r>
+                      <m:sSup>
+                        <m:sSupPr>
+                          <m:ctrlPr>
+                            <a:rPr lang="en-US" altLang="pt-PT" sz="1600" i="1">
+                              <a:latin typeface="DejaVu Math TeX Gyre" panose="02000503000000000000" charset="0"/>
+                              <a:cs typeface="DejaVu Math TeX Gyre" panose="02000503000000000000" charset="0"/>
+                              <a:sym typeface="+mn-ea"/>
+                            </a:rPr>
+                          </m:ctrlPr>
+                        </m:sSupPr>
+                        <m:e>
+                          <m:r>
+                            <a:rPr lang="en-US" altLang="pt-PT" sz="1600" i="1">
+                              <a:latin typeface="DejaVu Math TeX Gyre" panose="02000503000000000000" charset="0"/>
+                              <a:cs typeface="DejaVu Math TeX Gyre" panose="02000503000000000000" charset="0"/>
+                              <a:sym typeface="+mn-ea"/>
+                            </a:rPr>
+                            <m:t>𝑥</m:t>
+                          </m:r>
+                        </m:e>
+                        <m:sup>
+                          <m:r>
+                            <a:rPr lang="en-US" altLang="pt-PT" sz="1600" i="1">
+                              <a:latin typeface="DejaVu Math TeX Gyre" panose="02000503000000000000" charset="0"/>
+                              <a:cs typeface="DejaVu Math TeX Gyre" panose="02000503000000000000" charset="0"/>
+                              <a:sym typeface="+mn-ea"/>
+                            </a:rPr>
+                            <m:t>𝐿</m:t>
+                          </m:r>
+                        </m:sup>
+                      </m:sSup>
+                      <m:r>
+                        <a:rPr lang="en-US" altLang="pt-PT" sz="1600" i="1">
+                          <a:latin typeface="DejaVu Math TeX Gyre" panose="02000503000000000000" charset="0"/>
+                          <a:ea typeface="MS Mincho" charset="0"/>
+                          <a:cs typeface="DejaVu Math TeX Gyre" panose="02000503000000000000" charset="0"/>
+                          <a:sym typeface="+mn-ea"/>
+                        </a:rPr>
+                        <m:t>)</m:t>
+                      </m:r>
+                    </m:oMath>
+                  </a14:m>
+                  <a:endParaRPr lang="en-US" altLang="pt-PT" sz="1600" i="1">
+                    <a:cs typeface="+mn-lt"/>
+                    <a:sym typeface="+mn-ea"/>
+                  </a:endParaRPr>
+                </a:p>
+              </p:txBody>
+            </p:sp>
+          </mc:Choice>
+          <mc:Fallback>
+            <p:sp>
+              <p:nvSpPr>
+                <p:cNvPr id="27" name="Text Box 26"/>
+                <p:cNvSpPr txBox="1">
+                  <a:spLocks noRot="1" noChangeAspect="1" noMove="1" noResize="1" noEditPoints="1" noAdjustHandles="1" noChangeArrowheads="1" noChangeShapeType="1" noTextEdit="1"/>
+                </p:cNvSpPr>
+                <p:nvPr/>
+              </p:nvSpPr>
+              <p:spPr>
+                <a:xfrm>
+                  <a:off x="4706" y="1322"/>
+                  <a:ext cx="9789" cy="3224"/>
+                </a:xfrm>
+                <a:prstGeom prst="rect">
+                  <a:avLst/>
+                </a:prstGeom>
+                <a:blipFill rotWithShape="1">
+                  <a:blip r:embed="rId1"/>
+                </a:blipFill>
+              </p:spPr>
+              <p:txBody>
+                <a:bodyPr/>
+                <a:lstStyle/>
+                <a:p>
+                  <a:r>
+                    <a:rPr lang="en-US" altLang="en-US">
+                      <a:noFill/>
+                    </a:rPr>
+                    <a:t> </a:t>
+                  </a:r>
+                </a:p>
+              </p:txBody>
+            </p:sp>
+          </mc:Fallback>
+        </mc:AlternateContent>
+        <p:sp>
+          <p:nvSpPr>
+            <p:cNvPr id="2" name="Text Box 1"/>
+            <p:cNvSpPr txBox="1"/>
+            <p:nvPr/>
+          </p:nvSpPr>
+          <p:spPr>
+            <a:xfrm>
+              <a:off x="6814" y="451"/>
+              <a:ext cx="5574" cy="871"/>
+            </a:xfrm>
+            <a:prstGeom prst="rect">
+              <a:avLst/>
+            </a:prstGeom>
+            <a:noFill/>
+          </p:spPr>
+          <p:txBody>
+            <a:bodyPr wrap="square" rtlCol="0">
+              <a:spAutoFit/>
+            </a:bodyPr>
+            <a:p>
+              <a:pPr lvl="0" indent="0" algn="ctr">
+                <a:lnSpc>
+                  <a:spcPct val="150000"/>
+                </a:lnSpc>
+                <a:buFont typeface="Arial" panose="020B0604020202020204" pitchFamily="34" charset="0"/>
+                <a:buNone/>
+              </a:pPr>
+              <a:r>
+                <a:rPr lang="pt-PT" sz="2000" b="1">
+                  <a:solidFill>
+                    <a:schemeClr val="accent2"/>
+                  </a:solidFill>
+                </a:rPr>
+                <a:t>PROBLEMA</a:t>
+              </a:r>
+              <a:endParaRPr lang="pt-PT" sz="2000" b="1">
+                <a:solidFill>
+                  <a:schemeClr val="accent2"/>
+                </a:solidFill>
+              </a:endParaRPr>
+            </a:p>
+          </p:txBody>
+        </p:sp>
+      </p:grpSp>
+      <p:grpSp>
+        <p:nvGrpSpPr>
+          <p:cNvPr id="6" name="Group 5"/>
+          <p:cNvGrpSpPr/>
+          <p:nvPr/>
+        </p:nvGrpSpPr>
+        <p:grpSpPr>
+          <a:xfrm>
+            <a:off x="2988310" y="3723005"/>
+            <a:ext cx="6771640" cy="1856740"/>
+            <a:chOff x="4706" y="451"/>
+            <a:chExt cx="10664" cy="2924"/>
+          </a:xfrm>
+        </p:grpSpPr>
+        <mc:AlternateContent xmlns:mc="http://schemas.openxmlformats.org/markup-compatibility/2006">
+          <mc:Choice xmlns:a14="http://schemas.microsoft.com/office/drawing/2010/main" Requires="a14">
+            <p:sp>
+              <p:nvSpPr>
+                <p:cNvPr id="8" name="Text Box 7"/>
+                <p:cNvSpPr txBox="1"/>
+                <p:nvPr/>
+              </p:nvSpPr>
+              <p:spPr>
+                <a:xfrm>
+                  <a:off x="4706" y="1322"/>
+                  <a:ext cx="10664" cy="2053"/>
+                </a:xfrm>
+                <a:prstGeom prst="rect">
+                  <a:avLst/>
+                </a:prstGeom>
+                <a:noFill/>
+              </p:spPr>
+              <p:txBody>
+                <a:bodyPr wrap="square" rtlCol="0">
+                  <a:spAutoFit/>
+                </a:bodyPr>
+                <a:p>
+                  <a:pPr lvl="0" indent="0" algn="just">
+                    <a:lnSpc>
+                      <a:spcPct val="150000"/>
+                    </a:lnSpc>
+                    <a:buFont typeface="Arial" panose="020B0604020202020204" pitchFamily="34" charset="0"/>
+                    <a:buNone/>
+                  </a:pPr>
+                  <a:r>
+                    <a:rPr lang="pt-PT" altLang="en-US" sz="1600">
+                      <a:cs typeface="+mn-lt"/>
+                      <a:sym typeface="+mn-ea"/>
+                    </a:rPr>
+                    <a:t>Ao invés de sempre perturbar o </a:t>
+                  </a:r>
+                  <a14:m>
+                    <m:oMath xmlns:m="http://schemas.openxmlformats.org/officeDocument/2006/math">
+                      <m:r>
+                        <a:rPr lang="en-US" sz="1600">
+                          <a:solidFill>
+                            <a:schemeClr val="tx1"/>
+                          </a:solidFill>
+                          <a:latin typeface="DejaVu Math TeX Gyre" panose="02000503000000000000" charset="0"/>
+                          <a:ea typeface="MS Mincho" charset="0"/>
+                          <a:cs typeface="DejaVu Math TeX Gyre" panose="02000503000000000000" charset="0"/>
+                        </a:rPr>
+                        <m:t>𝜎</m:t>
+                      </m:r>
+                    </m:oMath>
+                  </a14:m>
+                  <a:r>
+                    <a:rPr lang="pt-PT" altLang="en-US" sz="1600">
+                      <a:cs typeface="+mn-lt"/>
+                      <a:sym typeface="+mn-ea"/>
+                    </a:rPr>
+                    <a:t> gerand</a:t>
+                  </a:r>
+                  <a:r>
+                    <a:rPr lang="pt-PT" altLang="en-US" sz="1600">
+                      <a:solidFill>
+                        <a:schemeClr val="tx1"/>
+                      </a:solidFill>
+                      <a:cs typeface="+mn-lt"/>
+                      <a:sym typeface="+mn-ea"/>
+                    </a:rPr>
+                    <a:t>o o </a:t>
+                  </a:r>
+                  <a14:m>
+                    <m:oMath xmlns:m="http://schemas.openxmlformats.org/officeDocument/2006/math">
+                      <m:sSup>
+                        <m:sSupPr>
+                          <m:ctrlPr>
+                            <a:rPr lang="en-US" sz="1600">
+                              <a:solidFill>
+                                <a:schemeClr val="tx1"/>
+                              </a:solidFill>
+                              <a:latin typeface="DejaVu Math TeX Gyre" panose="02000503000000000000" charset="0"/>
+                              <a:cs typeface="DejaVu Math TeX Gyre" panose="02000503000000000000" charset="0"/>
+                            </a:rPr>
+                          </m:ctrlPr>
+                        </m:sSupPr>
+                        <m:e>
+                          <m:r>
+                            <a:rPr lang="en-US" sz="1600">
+                              <a:solidFill>
+                                <a:schemeClr val="tx1"/>
+                              </a:solidFill>
+                              <a:latin typeface="DejaVu Math TeX Gyre" panose="02000503000000000000" charset="0"/>
+                              <a:ea typeface="MS Mincho" charset="0"/>
+                              <a:cs typeface="DejaVu Math TeX Gyre" panose="02000503000000000000" charset="0"/>
+                            </a:rPr>
+                            <m:t>𝜎</m:t>
+                          </m:r>
+                        </m:e>
+                        <m:sup>
+                          <m:r>
+                            <a:rPr lang="en-US" sz="1600">
+                              <a:solidFill>
+                                <a:schemeClr val="tx1"/>
+                              </a:solidFill>
+                              <a:latin typeface="DejaVu Math TeX Gyre" panose="02000503000000000000" charset="0"/>
+                              <a:ea typeface="MS Mincho" charset="0"/>
+                              <a:cs typeface="DejaVu Math TeX Gyre" panose="02000503000000000000" charset="0"/>
+                            </a:rPr>
+                            <m:t>’</m:t>
+                          </m:r>
+                        </m:sup>
+                      </m:sSup>
+                    </m:oMath>
+                  </a14:m>
+                  <a:r>
+                    <a:rPr lang="pt-PT" altLang="en-US" sz="1600">
+                      <a:cs typeface="+mn-lt"/>
+                      <a:sym typeface="+mn-ea"/>
+                    </a:rPr>
+                    <a:t>, poderia perturbar diretamente o </a:t>
+                  </a:r>
+                  <a14:m>
+                    <m:oMath xmlns:m="http://schemas.openxmlformats.org/officeDocument/2006/math">
+                      <m:r>
+                        <a:rPr lang="en-US" altLang="pt-PT" sz="1600">
+                          <a:latin typeface="DejaVu Math TeX Gyre" panose="02000503000000000000" charset="0"/>
+                          <a:ea typeface="MS Mincho" charset="0"/>
+                          <a:cs typeface="DejaVu Math TeX Gyre" panose="02000503000000000000" charset="0"/>
+                          <a:sym typeface="+mn-ea"/>
+                        </a:rPr>
+                        <m:t>𝜌</m:t>
+                      </m:r>
+                    </m:oMath>
+                  </a14:m>
+                  <a:r>
+                    <a:rPr lang="pt-PT" altLang="en-US" sz="1600">
+                      <a:cs typeface="+mn-lt"/>
+                      <a:sym typeface="+mn-ea"/>
+                    </a:rPr>
+                    <a:t> gerando o </a:t>
+                  </a:r>
+                  <a14:m>
+                    <m:oMath xmlns:m="http://schemas.openxmlformats.org/officeDocument/2006/math">
+                      <m:sSup>
+                        <m:sSupPr>
+                          <m:ctrlPr>
+                            <a:rPr lang="en-US" sz="1600">
+                              <a:solidFill>
+                                <a:schemeClr val="tx1"/>
+                              </a:solidFill>
+                              <a:latin typeface="DejaVu Math TeX Gyre" panose="02000503000000000000" charset="0"/>
+                              <a:cs typeface="DejaVu Math TeX Gyre" panose="02000503000000000000" charset="0"/>
+                            </a:rPr>
+                          </m:ctrlPr>
+                        </m:sSupPr>
+                        <m:e>
+                          <m:r>
+                            <a:rPr lang="en-US" sz="1600">
+                              <a:solidFill>
+                                <a:schemeClr val="tx1"/>
+                              </a:solidFill>
+                              <a:latin typeface="DejaVu Math TeX Gyre" panose="02000503000000000000" charset="0"/>
+                              <a:ea typeface="MS Mincho" charset="0"/>
+                              <a:cs typeface="DejaVu Math TeX Gyre" panose="02000503000000000000" charset="0"/>
+                            </a:rPr>
+                            <m:t>𝜌</m:t>
+                          </m:r>
+                        </m:e>
+                        <m:sup>
+                          <m:r>
+                            <a:rPr lang="en-US" sz="1600">
+                              <a:solidFill>
+                                <a:schemeClr val="tx1"/>
+                              </a:solidFill>
+                              <a:latin typeface="DejaVu Math TeX Gyre" panose="02000503000000000000" charset="0"/>
+                              <a:ea typeface="MS Mincho" charset="0"/>
+                              <a:cs typeface="DejaVu Math TeX Gyre" panose="02000503000000000000" charset="0"/>
+                            </a:rPr>
+                            <m:t>’</m:t>
+                          </m:r>
+                        </m:sup>
+                      </m:sSup>
+                    </m:oMath>
+                  </a14:m>
+                  <a:r>
+                    <a:rPr lang="pt-PT" altLang="en-US" sz="1600">
+                      <a:solidFill>
+                        <a:schemeClr val="tx1"/>
+                      </a:solidFill>
+                      <a:cs typeface="+mn-lt"/>
+                    </a:rPr>
+                    <a:t>, </a:t>
+                  </a:r>
+                  <a:r>
+                    <a:rPr lang="pt-PT" altLang="en-US" sz="1600">
+                      <a:cs typeface="+mn-lt"/>
+                      <a:sym typeface="+mn-ea"/>
+                    </a:rPr>
+                    <a:t>com a mesma metodologia. No momento da perturbação nas variáveis, perturba com </a:t>
+                  </a:r>
+                  <a14:m>
+                    <m:oMath xmlns:m="http://schemas.openxmlformats.org/officeDocument/2006/math">
+                      <m:r>
+                        <a:rPr lang="en-US" altLang="pt-PT" sz="1600" i="1">
+                          <a:latin typeface="DejaVu Math TeX Gyre" panose="02000503000000000000" charset="0"/>
+                          <a:ea typeface="MS Mincho" charset="0"/>
+                          <a:cs typeface="DejaVu Math TeX Gyre" panose="02000503000000000000" charset="0"/>
+                          <a:sym typeface="+mn-ea"/>
+                        </a:rPr>
+                        <m:t>𝜎</m:t>
+                      </m:r>
+                      <m:r>
+                        <a:rPr lang="en-US" altLang="pt-PT" sz="1600" i="1">
+                          <a:latin typeface="DejaVu Math TeX Gyre" panose="02000503000000000000" charset="0"/>
+                          <a:ea typeface="MS Mincho" charset="0"/>
+                          <a:cs typeface="DejaVu Math TeX Gyre" panose="02000503000000000000" charset="0"/>
+                          <a:sym typeface="+mn-ea"/>
+                        </a:rPr>
+                        <m:t>=</m:t>
+                      </m:r>
+                      <m:r>
+                        <a:rPr lang="en-US" altLang="pt-PT" sz="1600" i="1">
+                          <a:latin typeface="DejaVu Math TeX Gyre" panose="02000503000000000000" charset="0"/>
+                          <a:ea typeface="MS Mincho" charset="0"/>
+                          <a:cs typeface="DejaVu Math TeX Gyre" panose="02000503000000000000" charset="0"/>
+                          <a:sym typeface="+mn-ea"/>
+                        </a:rPr>
+                        <m:t>𝜌</m:t>
+                      </m:r>
+                      <m:r>
+                        <a:rPr lang="en-US" altLang="pt-PT" sz="1600" i="1">
+                          <a:latin typeface="DejaVu Math TeX Gyre" panose="02000503000000000000" charset="0"/>
+                          <a:ea typeface="MS Mincho" charset="0"/>
+                          <a:cs typeface="DejaVu Math TeX Gyre" panose="02000503000000000000" charset="0"/>
+                          <a:sym typeface="+mn-ea"/>
+                        </a:rPr>
+                        <m:t>’</m:t>
+                      </m:r>
+                      <m:r>
+                        <a:rPr lang="en-US" altLang="pt-PT" sz="1600" i="1">
+                          <a:latin typeface="DejaVu Math TeX Gyre" panose="02000503000000000000" charset="0"/>
+                          <a:ea typeface="MS Mincho" charset="0"/>
+                          <a:cs typeface="DejaVu Math TeX Gyre" panose="02000503000000000000" charset="0"/>
+                          <a:sym typeface="+mn-ea"/>
+                        </a:rPr>
+                        <m:t>∙(</m:t>
+                      </m:r>
+                      <m:sSup>
+                        <m:sSupPr>
+                          <m:ctrlPr>
+                            <a:rPr lang="en-US" altLang="pt-PT" sz="1600" i="1">
+                              <a:latin typeface="DejaVu Math TeX Gyre" panose="02000503000000000000" charset="0"/>
+                              <a:cs typeface="DejaVu Math TeX Gyre" panose="02000503000000000000" charset="0"/>
+                              <a:sym typeface="+mn-ea"/>
+                            </a:rPr>
+                          </m:ctrlPr>
+                        </m:sSupPr>
+                        <m:e>
+                          <m:r>
+                            <a:rPr lang="en-US" altLang="pt-PT" sz="1600" i="1">
+                              <a:latin typeface="DejaVu Math TeX Gyre" panose="02000503000000000000" charset="0"/>
+                              <a:cs typeface="DejaVu Math TeX Gyre" panose="02000503000000000000" charset="0"/>
+                              <a:sym typeface="+mn-ea"/>
+                            </a:rPr>
+                            <m:t>𝑥</m:t>
+                          </m:r>
+                        </m:e>
+                        <m:sup>
+                          <m:r>
+                            <a:rPr lang="en-US" altLang="pt-PT" sz="1600" i="1">
+                              <a:latin typeface="DejaVu Math TeX Gyre" panose="02000503000000000000" charset="0"/>
+                              <a:cs typeface="DejaVu Math TeX Gyre" panose="02000503000000000000" charset="0"/>
+                              <a:sym typeface="+mn-ea"/>
+                            </a:rPr>
+                            <m:t>𝑈</m:t>
+                          </m:r>
+                        </m:sup>
+                      </m:sSup>
+                      <m:r>
+                        <a:rPr lang="en-US" altLang="pt-PT" sz="1600" i="1">
+                          <a:latin typeface="DejaVu Math TeX Gyre" panose="02000503000000000000" charset="0"/>
+                          <a:cs typeface="DejaVu Math TeX Gyre" panose="02000503000000000000" charset="0"/>
+                          <a:sym typeface="+mn-ea"/>
+                        </a:rPr>
+                        <m:t>−</m:t>
+                      </m:r>
+                      <m:sSup>
+                        <m:sSupPr>
+                          <m:ctrlPr>
+                            <a:rPr lang="en-US" altLang="pt-PT" sz="1600" i="1">
+                              <a:latin typeface="DejaVu Math TeX Gyre" panose="02000503000000000000" charset="0"/>
+                              <a:cs typeface="DejaVu Math TeX Gyre" panose="02000503000000000000" charset="0"/>
+                              <a:sym typeface="+mn-ea"/>
+                            </a:rPr>
+                          </m:ctrlPr>
+                        </m:sSupPr>
+                        <m:e>
+                          <m:r>
+                            <a:rPr lang="en-US" altLang="pt-PT" sz="1600" i="1">
+                              <a:latin typeface="DejaVu Math TeX Gyre" panose="02000503000000000000" charset="0"/>
+                              <a:cs typeface="DejaVu Math TeX Gyre" panose="02000503000000000000" charset="0"/>
+                              <a:sym typeface="+mn-ea"/>
+                            </a:rPr>
+                            <m:t>𝑥</m:t>
+                          </m:r>
+                        </m:e>
+                        <m:sup>
+                          <m:r>
+                            <a:rPr lang="en-US" altLang="pt-PT" sz="1600" i="1">
+                              <a:latin typeface="DejaVu Math TeX Gyre" panose="02000503000000000000" charset="0"/>
+                              <a:cs typeface="DejaVu Math TeX Gyre" panose="02000503000000000000" charset="0"/>
+                              <a:sym typeface="+mn-ea"/>
+                            </a:rPr>
+                            <m:t>𝐿</m:t>
+                          </m:r>
+                        </m:sup>
+                      </m:sSup>
+                      <m:r>
+                        <a:rPr lang="en-US" altLang="pt-PT" sz="1600" i="1">
+                          <a:latin typeface="DejaVu Math TeX Gyre" panose="02000503000000000000" charset="0"/>
+                          <a:ea typeface="MS Mincho" charset="0"/>
+                          <a:cs typeface="DejaVu Math TeX Gyre" panose="02000503000000000000" charset="0"/>
+                          <a:sym typeface="+mn-ea"/>
+                        </a:rPr>
+                        <m:t>)</m:t>
+                      </m:r>
+                    </m:oMath>
+                  </a14:m>
+                  <a:endParaRPr lang="pt-PT" altLang="en-US" sz="1600">
+                    <a:cs typeface="+mn-lt"/>
+                    <a:sym typeface="+mn-ea"/>
+                  </a:endParaRPr>
+                </a:p>
+              </p:txBody>
+            </p:sp>
+          </mc:Choice>
+          <mc:Fallback>
+            <p:sp>
+              <p:nvSpPr>
+                <p:cNvPr id="8" name="Text Box 7"/>
+                <p:cNvSpPr txBox="1">
+                  <a:spLocks noRot="1" noChangeAspect="1" noMove="1" noResize="1" noEditPoints="1" noAdjustHandles="1" noChangeArrowheads="1" noChangeShapeType="1" noTextEdit="1"/>
+                </p:cNvSpPr>
+                <p:nvPr/>
+              </p:nvSpPr>
+              <p:spPr>
+                <a:xfrm>
+                  <a:off x="4706" y="1322"/>
+                  <a:ext cx="10664" cy="2053"/>
+                </a:xfrm>
+                <a:prstGeom prst="rect">
+                  <a:avLst/>
+                </a:prstGeom>
+                <a:blipFill rotWithShape="1">
+                  <a:blip r:embed="rId2"/>
+                </a:blipFill>
+              </p:spPr>
+              <p:txBody>
+                <a:bodyPr/>
+                <a:lstStyle/>
+                <a:p>
+                  <a:r>
+                    <a:rPr lang="en-US" altLang="en-US">
+                      <a:noFill/>
+                    </a:rPr>
+                    <a:t> </a:t>
+                  </a:r>
+                </a:p>
+              </p:txBody>
+            </p:sp>
+          </mc:Fallback>
+        </mc:AlternateContent>
+        <p:sp>
+          <p:nvSpPr>
+            <p:cNvPr id="9" name="Text Box 8"/>
+            <p:cNvSpPr txBox="1"/>
+            <p:nvPr/>
+          </p:nvSpPr>
+          <p:spPr>
+            <a:xfrm>
+              <a:off x="6814" y="451"/>
+              <a:ext cx="5574" cy="871"/>
+            </a:xfrm>
+            <a:prstGeom prst="rect">
+              <a:avLst/>
+            </a:prstGeom>
+            <a:noFill/>
+          </p:spPr>
+          <p:txBody>
+            <a:bodyPr wrap="square" rtlCol="0">
+              <a:spAutoFit/>
+            </a:bodyPr>
+            <a:p>
+              <a:pPr lvl="0" indent="0" algn="ctr">
+                <a:lnSpc>
+                  <a:spcPct val="150000"/>
+                </a:lnSpc>
+                <a:buFont typeface="Arial" panose="020B0604020202020204" pitchFamily="34" charset="0"/>
+                <a:buNone/>
+              </a:pPr>
+              <a:r>
+                <a:rPr lang="pt-PT" sz="2000" b="1">
+                  <a:solidFill>
+                    <a:schemeClr val="accent2"/>
+                  </a:solidFill>
+                </a:rPr>
+                <a:t>SUGESTÃO</a:t>
+              </a:r>
+              <a:endParaRPr lang="pt-PT" sz="2000" b="1">
+                <a:solidFill>
+                  <a:schemeClr val="accent2"/>
+                </a:solidFill>
+              </a:endParaRPr>
+            </a:p>
+          </p:txBody>
+        </p:sp>
+      </p:grpSp>
+    </p:spTree>
+  </p:cSld>
+  <p:clrMapOvr>
+    <a:masterClrMapping/>
+  </p:clrMapOvr>
+</p:sld>
+</file>
+
+<file path=ppt/slides/slide3.xml><?xml version="1.0" encoding="utf-8"?>
+<p:sld xmlns:a="http://schemas.openxmlformats.org/drawingml/2006/main" xmlns:r="http://schemas.openxmlformats.org/officeDocument/2006/relationships" xmlns:p="http://schemas.openxmlformats.org/presentationml/2006/main">
+  <p:cSld>
+    <p:spTree>
+      <p:nvGrpSpPr>
+        <p:cNvPr id="1" name=""/>
+        <p:cNvGrpSpPr/>
+        <p:nvPr/>
+      </p:nvGrpSpPr>
+      <p:grpSpPr/>
+      <mc:AlternateContent xmlns:mc="http://schemas.openxmlformats.org/markup-compatibility/2006">
+        <mc:Choice xmlns:a14="http://schemas.microsoft.com/office/drawing/2010/main" Requires="a14">
+          <p:sp>
+            <p:nvSpPr>
+              <p:cNvPr id="27" name="Text Box 26"/>
+              <p:cNvSpPr txBox="1"/>
+              <p:nvPr/>
+            </p:nvSpPr>
+            <p:spPr>
+              <a:xfrm>
+                <a:off x="2619375" y="906780"/>
+                <a:ext cx="6953250" cy="5044440"/>
+              </a:xfrm>
+              <a:prstGeom prst="rect">
+                <a:avLst/>
+              </a:prstGeom>
+              <a:noFill/>
+            </p:spPr>
+            <p:txBody>
+              <a:bodyPr wrap="square" rtlCol="0">
+                <a:spAutoFit/>
+              </a:bodyPr>
+              <a:p>
+                <a:pPr lvl="0" indent="0" algn="just">
+                  <a:lnSpc>
+                    <a:spcPct val="150000"/>
+                  </a:lnSpc>
+                  <a:buFont typeface="Arial" panose="020B0604020202020204" pitchFamily="34" charset="0"/>
+                  <a:buNone/>
+                </a:pPr>
+                <a:r>
+                  <a:rPr lang="pt-PT" altLang="en-US" sz="1600" b="1">
+                    <a:sym typeface="+mn-ea"/>
+                  </a:rPr>
+                  <a:t>ALTERNATIVA 1:</a:t>
+                </a:r>
+                <a:endParaRPr lang="pt-PT" altLang="en-US" sz="1600" b="1"/>
+              </a:p>
+              <a:p>
+                <a:pPr marL="285750" lvl="0" indent="-285750" algn="just">
+                  <a:lnSpc>
+                    <a:spcPct val="150000"/>
+                  </a:lnSpc>
+                  <a:buFont typeface="Arial" panose="020B0604020202020204" pitchFamily="34" charset="0"/>
+                  <a:buChar char="•"/>
+                </a:pPr>
+                <a:r>
+                  <a:rPr lang="pt-PT" altLang="en-US" sz="1600"/>
+                  <a:t>FOR cada variável:</a:t>
+                </a:r>
+                <a:endParaRPr lang="pt-PT" altLang="en-US" sz="1600"/>
+              </a:p>
+              <a:p>
+                <a:pPr marL="742950" lvl="1" indent="-285750" algn="just">
+                  <a:lnSpc>
+                    <a:spcPct val="150000"/>
+                  </a:lnSpc>
+                  <a:buFont typeface="Arial" panose="020B0604020202020204" pitchFamily="34" charset="0"/>
+                  <a:buChar char="•"/>
+                </a:pPr>
+                <a:r>
+                  <a:rPr lang="pt-PT" altLang="en-US" sz="1600">
+                    <a:sym typeface="+mn-ea"/>
+                  </a:rPr>
+                  <a:t>Perturba com </a:t>
+                </a:r>
+                <a14:m>
+                  <m:oMath xmlns:m="http://schemas.openxmlformats.org/officeDocument/2006/math">
+                    <m:sSubSup>
+                      <m:sSubSupPr>
+                        <m:ctrlPr>
+                          <a:rPr lang="en-US" sz="1600" i="1">
+                            <a:latin typeface="DejaVu Math TeX Gyre" panose="02000503000000000000" charset="0"/>
+                            <a:cs typeface="DejaVu Math TeX Gyre" panose="02000503000000000000" charset="0"/>
+                          </a:rPr>
+                        </m:ctrlPr>
+                      </m:sSubSupPr>
+                      <m:e>
+                        <m:r>
+                          <a:rPr lang="en-US" sz="1600" i="1">
+                            <a:latin typeface="DejaVu Math TeX Gyre" panose="02000503000000000000" charset="0"/>
+                            <a:cs typeface="DejaVu Math TeX Gyre" panose="02000503000000000000" charset="0"/>
+                          </a:rPr>
+                          <m:t>𝑥</m:t>
+                        </m:r>
+                      </m:e>
+                      <m:sub>
+                        <m:r>
+                          <a:rPr lang="en-US" sz="1600" i="1">
+                            <a:latin typeface="DejaVu Math TeX Gyre" panose="02000503000000000000" charset="0"/>
+                            <a:cs typeface="DejaVu Math TeX Gyre" panose="02000503000000000000" charset="0"/>
+                          </a:rPr>
+                          <m:t>𝑖</m:t>
+                        </m:r>
+                      </m:sub>
+                      <m:sup>
+                        <m:r>
+                          <a:rPr lang="en-US" sz="1600" i="1">
+                            <a:latin typeface="DejaVu Math TeX Gyre" panose="02000503000000000000" charset="0"/>
+                            <a:cs typeface="DejaVu Math TeX Gyre" panose="02000503000000000000" charset="0"/>
+                          </a:rPr>
+                          <m:t>’</m:t>
+                        </m:r>
+                      </m:sup>
+                    </m:sSubSup>
+                    <m:r>
+                      <a:rPr lang="en-US" sz="1600" i="1">
+                        <a:latin typeface="DejaVu Math TeX Gyre" panose="02000503000000000000" charset="0"/>
+                        <a:cs typeface="DejaVu Math TeX Gyre" panose="02000503000000000000" charset="0"/>
+                      </a:rPr>
+                      <m:t>=</m:t>
+                    </m:r>
+                    <m:sSub>
+                      <m:sSubPr>
+                        <m:ctrlPr>
+                          <a:rPr lang="en-US" sz="1600" i="1">
+                            <a:latin typeface="DejaVu Math TeX Gyre" panose="02000503000000000000" charset="0"/>
+                            <a:cs typeface="DejaVu Math TeX Gyre" panose="02000503000000000000" charset="0"/>
+                          </a:rPr>
+                        </m:ctrlPr>
+                      </m:sSubPr>
+                      <m:e>
+                        <m:r>
+                          <a:rPr lang="en-US" sz="1600" i="1">
+                            <a:latin typeface="DejaVu Math TeX Gyre" panose="02000503000000000000" charset="0"/>
+                            <a:cs typeface="DejaVu Math TeX Gyre" panose="02000503000000000000" charset="0"/>
+                          </a:rPr>
+                          <m:t>𝑥</m:t>
+                        </m:r>
+                      </m:e>
+                      <m:sub>
+                        <m:r>
+                          <a:rPr lang="en-US" sz="1600" i="1">
+                            <a:latin typeface="DejaVu Math TeX Gyre" panose="02000503000000000000" charset="0"/>
+                            <a:cs typeface="DejaVu Math TeX Gyre" panose="02000503000000000000" charset="0"/>
+                          </a:rPr>
+                          <m:t>𝑖</m:t>
+                        </m:r>
+                      </m:sub>
+                    </m:sSub>
+                    <m:r>
+                      <a:rPr lang="en-US" sz="1600" i="1">
+                        <a:latin typeface="DejaVu Math TeX Gyre" panose="02000503000000000000" charset="0"/>
+                        <a:cs typeface="DejaVu Math TeX Gyre" panose="02000503000000000000" charset="0"/>
+                      </a:rPr>
+                      <m:t>+</m:t>
+                    </m:r>
+                    <m:r>
+                      <a:rPr lang="en-US" sz="1600" i="1">
+                        <a:latin typeface="DejaVu Math TeX Gyre" panose="02000503000000000000" charset="0"/>
+                        <a:cs typeface="DejaVu Math TeX Gyre" panose="02000503000000000000" charset="0"/>
+                      </a:rPr>
+                      <m:t>𝑁</m:t>
+                    </m:r>
+                    <m:r>
+                      <a:rPr lang="en-US" sz="1600" i="1">
+                        <a:latin typeface="DejaVu Math TeX Gyre" panose="02000503000000000000" charset="0"/>
+                        <a:cs typeface="DejaVu Math TeX Gyre" panose="02000503000000000000" charset="0"/>
+                      </a:rPr>
+                      <m:t>(</m:t>
+                    </m:r>
+                    <m:r>
+                      <a:rPr lang="en-US" sz="1600" i="1">
+                        <a:latin typeface="DejaVu Math TeX Gyre" panose="02000503000000000000" charset="0"/>
+                        <a:cs typeface="DejaVu Math TeX Gyre" panose="02000503000000000000" charset="0"/>
+                      </a:rPr>
+                      <m:t>0</m:t>
+                    </m:r>
+                    <m:r>
+                      <a:rPr lang="en-US" sz="1600" i="1">
+                        <a:latin typeface="DejaVu Math TeX Gyre" panose="02000503000000000000" charset="0"/>
+                        <a:cs typeface="DejaVu Math TeX Gyre" panose="02000503000000000000" charset="0"/>
+                      </a:rPr>
+                      <m:t>,</m:t>
+                    </m:r>
+                    <m:r>
+                      <a:rPr lang="en-US" sz="1600" i="1">
+                        <a:latin typeface="DejaVu Math TeX Gyre" panose="02000503000000000000" charset="0"/>
+                        <a:cs typeface="DejaVu Math TeX Gyre" panose="02000503000000000000" charset="0"/>
+                      </a:rPr>
+                      <m:t>𝜎</m:t>
+                    </m:r>
+                    <m:r>
+                      <a:rPr lang="en-US" sz="1600" i="1">
+                        <a:latin typeface="DejaVu Math TeX Gyre" panose="02000503000000000000" charset="0"/>
+                        <a:cs typeface="DejaVu Math TeX Gyre" panose="02000503000000000000" charset="0"/>
+                      </a:rPr>
+                      <m:t>)</m:t>
+                    </m:r>
+                  </m:oMath>
+                </a14:m>
+                <a:r>
+                  <a:rPr lang="pt-PT" altLang="en-US" sz="1600">
+                    <a:latin typeface="DejaVu Math TeX Gyre" panose="02000503000000000000" charset="0"/>
+                    <a:cs typeface="DejaVu Math TeX Gyre" panose="02000503000000000000" charset="0"/>
+                  </a:rPr>
+                  <a:t>, </a:t>
+                </a:r>
+                <a:r>
+                  <a:rPr lang="pt-PT" altLang="en-US" sz="1600">
+                    <a:sym typeface="+mn-ea"/>
+                  </a:rPr>
+                  <a:t>onde </a:t>
+                </a:r>
+                <a14:m>
+                  <m:oMath xmlns:m="http://schemas.openxmlformats.org/officeDocument/2006/math">
+                    <m:r>
+                      <a:rPr lang="en-US" altLang="pt-PT" sz="1600" i="1">
+                        <a:latin typeface="DejaVu Math TeX Gyre" panose="02000503000000000000" charset="0"/>
+                        <a:cs typeface="DejaVu Math TeX Gyre" panose="02000503000000000000" charset="0"/>
+                        <a:sym typeface="+mn-ea"/>
+                      </a:rPr>
+                      <m:t>𝜎</m:t>
+                    </m:r>
+                    <m:r>
+                      <a:rPr lang="en-US" altLang="pt-PT" sz="1600" i="1">
+                        <a:latin typeface="DejaVu Math TeX Gyre" panose="02000503000000000000" charset="0"/>
+                        <a:cs typeface="DejaVu Math TeX Gyre" panose="02000503000000000000" charset="0"/>
+                        <a:sym typeface="+mn-ea"/>
+                      </a:rPr>
+                      <m:t>=</m:t>
+                    </m:r>
+                    <m:r>
+                      <a:rPr lang="en-US" altLang="pt-PT" sz="1600" i="1">
+                        <a:latin typeface="DejaVu Math TeX Gyre" panose="02000503000000000000" charset="0"/>
+                        <a:cs typeface="DejaVu Math TeX Gyre" panose="02000503000000000000" charset="0"/>
+                        <a:sym typeface="+mn-ea"/>
+                      </a:rPr>
+                      <m:t>𝜌</m:t>
+                    </m:r>
+                    <m:r>
+                      <a:rPr lang="en-US" altLang="pt-PT" sz="1600" i="1">
+                        <a:latin typeface="DejaVu Math TeX Gyre" panose="02000503000000000000" charset="0"/>
+                        <a:cs typeface="DejaVu Math TeX Gyre" panose="02000503000000000000" charset="0"/>
+                        <a:sym typeface="+mn-ea"/>
+                      </a:rPr>
+                      <m:t>∙∆</m:t>
+                    </m:r>
+                    <m:r>
+                      <a:rPr lang="en-US" altLang="pt-PT" sz="1600" i="1">
+                        <a:latin typeface="DejaVu Math TeX Gyre" panose="02000503000000000000" charset="0"/>
+                        <a:cs typeface="DejaVu Math TeX Gyre" panose="02000503000000000000" charset="0"/>
+                        <a:sym typeface="+mn-ea"/>
+                      </a:rPr>
+                      <m:t>𝑥</m:t>
+                    </m:r>
+                    <m:r>
+                      <a:rPr lang="en-US" altLang="pt-PT" sz="1600" i="1" baseline="-25000">
+                        <a:latin typeface="DejaVu Math TeX Gyre" panose="02000503000000000000" charset="0"/>
+                        <a:cs typeface="DejaVu Math TeX Gyre" panose="02000503000000000000" charset="0"/>
+                        <a:sym typeface="+mn-ea"/>
+                      </a:rPr>
+                      <m:t>𝑖</m:t>
+                    </m:r>
+                  </m:oMath>
+                </a14:m>
+                <a:r>
+                  <a:rPr lang="pt-PT" altLang="en-US" sz="1600">
+                    <a:latin typeface="DejaVu Math TeX Gyre" panose="02000503000000000000" charset="0"/>
+                    <a:cs typeface="DejaVu Math TeX Gyre" panose="02000503000000000000" charset="0"/>
+                  </a:rPr>
+                  <a:t> </a:t>
+                </a:r>
+                <a:endParaRPr lang="pt-PT" altLang="en-US" sz="1600">
+                  <a:sym typeface="+mn-ea"/>
+                </a:endParaRPr>
+              </a:p>
+              <a:p>
+                <a:pPr marL="742950" lvl="1" indent="-285750" algn="just">
+                  <a:lnSpc>
+                    <a:spcPct val="150000"/>
+                  </a:lnSpc>
+                  <a:buFont typeface="Arial" panose="020B0604020202020204" pitchFamily="34" charset="0"/>
+                  <a:buChar char="•"/>
+                </a:pPr>
+                <a:r>
+                  <a:rPr lang="pt-PT" altLang="en-US" sz="1600">
+                    <a:sym typeface="+mn-ea"/>
+                  </a:rPr>
+                  <a:t>Calcula o valor de f(x) só com essa variável perturbada. Esse será o valor da adaptabilidade dessa variável.</a:t>
+                </a:r>
+                <a:endParaRPr lang="pt-PT" altLang="en-US" sz="1600">
+                  <a:sym typeface="+mn-ea"/>
+                </a:endParaRPr>
+              </a:p>
+              <a:p>
+                <a:pPr marL="285750" lvl="0" indent="-285750" algn="just">
+                  <a:lnSpc>
+                    <a:spcPct val="150000"/>
+                  </a:lnSpc>
+                  <a:buFont typeface="Arial" panose="020B0604020202020204" pitchFamily="34" charset="0"/>
+                  <a:buChar char="•"/>
+                </a:pPr>
+                <a:r>
+                  <a:rPr lang="pt-PT" altLang="en-US" sz="1600">
+                    <a:sym typeface="+mn-ea"/>
+                  </a:rPr>
+                  <a:t>ENDFOR</a:t>
+                </a:r>
+                <a:endParaRPr lang="pt-PT" altLang="en-US" sz="1600">
+                  <a:sym typeface="+mn-ea"/>
+                </a:endParaRPr>
+              </a:p>
+              <a:p>
+                <a:pPr marL="285750" lvl="0" indent="-285750" algn="just">
+                  <a:lnSpc>
+                    <a:spcPct val="150000"/>
+                  </a:lnSpc>
+                  <a:buFont typeface="Arial" panose="020B0604020202020204" pitchFamily="34" charset="0"/>
+                  <a:buChar char="•"/>
+                </a:pPr>
+                <a:r>
+                  <a:rPr lang="pt-PT" altLang="en-US" sz="1600">
+                    <a:solidFill>
+                      <a:srgbClr val="FF0000"/>
+                    </a:solidFill>
+                    <a:sym typeface="+mn-ea"/>
+                  </a:rPr>
+                  <a:t>Perturba a porcentagem com </a:t>
+                </a:r>
+                <a14:m>
+                  <m:oMath xmlns:m="http://schemas.openxmlformats.org/officeDocument/2006/math">
+                    <m:sSup>
+                      <m:sSupPr>
+                        <m:ctrlPr>
+                          <a:rPr lang="en-US" sz="1600" i="1">
+                            <a:solidFill>
+                              <a:srgbClr val="FF0000"/>
+                            </a:solidFill>
+                            <a:latin typeface="DejaVu Math TeX Gyre" panose="02000503000000000000" charset="0"/>
+                            <a:cs typeface="DejaVu Math TeX Gyre" panose="02000503000000000000" charset="0"/>
+                          </a:rPr>
+                        </m:ctrlPr>
+                      </m:sSupPr>
+                      <m:e>
+                        <m:r>
+                          <a:rPr lang="en-US" sz="1600" i="1">
+                            <a:solidFill>
+                              <a:srgbClr val="FF0000"/>
+                            </a:solidFill>
+                            <a:latin typeface="DejaVu Math TeX Gyre" panose="02000503000000000000" charset="0"/>
+                            <a:cs typeface="DejaVu Math TeX Gyre" panose="02000503000000000000" charset="0"/>
+                          </a:rPr>
+                          <m:t>𝜌</m:t>
+                        </m:r>
+                      </m:e>
+                      <m:sup>
+                        <m:r>
+                          <a:rPr lang="en-US" sz="1600" i="1">
+                            <a:solidFill>
+                              <a:srgbClr val="FF0000"/>
+                            </a:solidFill>
+                            <a:latin typeface="DejaVu Math TeX Gyre" panose="02000503000000000000" charset="0"/>
+                            <a:cs typeface="DejaVu Math TeX Gyre" panose="02000503000000000000" charset="0"/>
+                          </a:rPr>
+                          <m:t>’</m:t>
+                        </m:r>
+                      </m:sup>
+                    </m:sSup>
+                    <m:r>
+                      <a:rPr lang="en-US" sz="1600" i="1">
+                        <a:solidFill>
+                          <a:srgbClr val="FF0000"/>
+                        </a:solidFill>
+                        <a:latin typeface="DejaVu Math TeX Gyre" panose="02000503000000000000" charset="0"/>
+                        <a:cs typeface="DejaVu Math TeX Gyre" panose="02000503000000000000" charset="0"/>
+                      </a:rPr>
+                      <m:t>=</m:t>
+                    </m:r>
+                    <m:r>
+                      <a:rPr lang="en-US" sz="1600" i="1">
+                        <a:solidFill>
+                          <a:srgbClr val="FF0000"/>
+                        </a:solidFill>
+                        <a:latin typeface="DejaVu Math TeX Gyre" panose="02000503000000000000" charset="0"/>
+                        <a:cs typeface="DejaVu Math TeX Gyre" panose="02000503000000000000" charset="0"/>
+                      </a:rPr>
+                      <m:t>𝜌</m:t>
+                    </m:r>
+                    <m:r>
+                      <a:rPr lang="en-US" sz="1600" i="1">
+                        <a:solidFill>
+                          <a:srgbClr val="FF0000"/>
+                        </a:solidFill>
+                        <a:latin typeface="DejaVu Math TeX Gyre" panose="02000503000000000000" charset="0"/>
+                        <a:cs typeface="DejaVu Math TeX Gyre" panose="02000503000000000000" charset="0"/>
+                      </a:rPr>
+                      <m:t>∙</m:t>
+                    </m:r>
+                    <m:r>
+                      <a:rPr lang="en-US" sz="1600" i="1">
+                        <a:solidFill>
+                          <a:srgbClr val="FF0000"/>
+                        </a:solidFill>
+                        <a:latin typeface="DejaVu Math TeX Gyre" panose="02000503000000000000" charset="0"/>
+                        <a:cs typeface="DejaVu Math TeX Gyre" panose="02000503000000000000" charset="0"/>
+                      </a:rPr>
+                      <m:t>𝐿𝑜𝑔𝑁𝑜𝑟𝑚𝑎𝑙</m:t>
+                    </m:r>
+                    <m:r>
+                      <a:rPr lang="en-US" sz="1600" i="1">
+                        <a:solidFill>
+                          <a:srgbClr val="FF0000"/>
+                        </a:solidFill>
+                        <a:latin typeface="DejaVu Math TeX Gyre" panose="02000503000000000000" charset="0"/>
+                        <a:cs typeface="DejaVu Math TeX Gyre" panose="02000503000000000000" charset="0"/>
+                      </a:rPr>
+                      <m:t>(</m:t>
+                    </m:r>
+                    <m:r>
+                      <a:rPr lang="en-US" sz="1600" i="1">
+                        <a:solidFill>
+                          <a:srgbClr val="FF0000"/>
+                        </a:solidFill>
+                        <a:latin typeface="DejaVu Math TeX Gyre" panose="02000503000000000000" charset="0"/>
+                        <a:cs typeface="DejaVu Math TeX Gyre" panose="02000503000000000000" charset="0"/>
+                      </a:rPr>
+                      <m:t>0</m:t>
+                    </m:r>
+                    <m:r>
+                      <a:rPr lang="en-US" sz="1600" i="1">
+                        <a:solidFill>
+                          <a:srgbClr val="FF0000"/>
+                        </a:solidFill>
+                        <a:latin typeface="DejaVu Math TeX Gyre" panose="02000503000000000000" charset="0"/>
+                        <a:cs typeface="DejaVu Math TeX Gyre" panose="02000503000000000000" charset="0"/>
+                      </a:rPr>
+                      <m:t>,</m:t>
+                    </m:r>
+                    <m:r>
+                      <a:rPr lang="en-US" sz="1600" i="1">
+                        <a:solidFill>
+                          <a:srgbClr val="FF0000"/>
+                        </a:solidFill>
+                        <a:latin typeface="DejaVu Math TeX Gyre" panose="02000503000000000000" charset="0"/>
+                        <a:cs typeface="DejaVu Math TeX Gyre" panose="02000503000000000000" charset="0"/>
+                      </a:rPr>
+                      <m:t>𝛼</m:t>
+                    </m:r>
+                    <m:r>
+                      <a:rPr lang="en-US" sz="1600" i="1">
+                        <a:solidFill>
+                          <a:srgbClr val="FF0000"/>
+                        </a:solidFill>
+                        <a:latin typeface="DejaVu Math TeX Gyre" panose="02000503000000000000" charset="0"/>
+                        <a:ea typeface="MS Mincho" charset="0"/>
+                        <a:cs typeface="DejaVu Math TeX Gyre" panose="02000503000000000000" charset="0"/>
+                      </a:rPr>
+                      <m:t>)</m:t>
+                    </m:r>
+                  </m:oMath>
+                </a14:m>
+                <a:r>
+                  <a:rPr lang="pt-PT" altLang="en-US" sz="1600">
+                    <a:solidFill>
+                      <a:srgbClr val="FF0000"/>
+                    </a:solidFill>
+                    <a:latin typeface="DejaVu Math TeX Gyre" panose="02000503000000000000" charset="0"/>
+                    <a:ea typeface="MS Mincho" charset="0"/>
+                    <a:cs typeface="DejaVu Math TeX Gyre" panose="02000503000000000000" charset="0"/>
+                  </a:rPr>
+                  <a:t>, </a:t>
+                </a:r>
+                <a:r>
+                  <a:rPr lang="pt-PT" altLang="en-US" sz="1600">
+                    <a:solidFill>
+                      <a:srgbClr val="FF0000"/>
+                    </a:solidFill>
+                    <a:sym typeface="+mn-ea"/>
+                  </a:rPr>
+                  <a:t>onde </a:t>
+                </a:r>
+                <a14:m>
+                  <m:oMath xmlns:m="http://schemas.openxmlformats.org/officeDocument/2006/math">
+                    <m:r>
+                      <a:rPr lang="en-US" altLang="pt-PT" sz="1600" i="1">
+                        <a:solidFill>
+                          <a:srgbClr val="FF0000"/>
+                        </a:solidFill>
+                        <a:latin typeface="DejaVu Math TeX Gyre" panose="02000503000000000000" charset="0"/>
+                        <a:cs typeface="DejaVu Math TeX Gyre" panose="02000503000000000000" charset="0"/>
+                        <a:sym typeface="+mn-ea"/>
+                      </a:rPr>
+                      <m:t>𝛼</m:t>
+                    </m:r>
+                    <m:r>
+                      <a:rPr lang="en-US" altLang="pt-PT" sz="1600" i="1">
+                        <a:solidFill>
+                          <a:srgbClr val="FF0000"/>
+                        </a:solidFill>
+                        <a:latin typeface="DejaVu Math TeX Gyre" panose="02000503000000000000" charset="0"/>
+                        <a:cs typeface="DejaVu Math TeX Gyre" panose="02000503000000000000" charset="0"/>
+                        <a:sym typeface="+mn-ea"/>
+                      </a:rPr>
+                      <m:t>=</m:t>
+                    </m:r>
+                    <m:f>
+                      <m:fPr>
+                        <m:type m:val="lin"/>
+                        <m:ctrlPr>
+                          <a:rPr lang="en-US" altLang="pt-PT" sz="1600" i="1">
+                            <a:solidFill>
+                              <a:srgbClr val="FF0000"/>
+                            </a:solidFill>
+                            <a:latin typeface="DejaVu Math TeX Gyre" panose="02000503000000000000" charset="0"/>
+                            <a:cs typeface="DejaVu Math TeX Gyre" panose="02000503000000000000" charset="0"/>
+                            <a:sym typeface="+mn-ea"/>
+                          </a:rPr>
+                        </m:ctrlPr>
+                      </m:fPr>
+                      <m:num>
+                        <m:r>
+                          <a:rPr lang="en-US" altLang="pt-PT" sz="1600" i="1">
+                            <a:solidFill>
+                              <a:srgbClr val="FF0000"/>
+                            </a:solidFill>
+                            <a:latin typeface="DejaVu Math TeX Gyre" panose="02000503000000000000" charset="0"/>
+                            <a:cs typeface="DejaVu Math TeX Gyre" panose="02000503000000000000" charset="0"/>
+                            <a:sym typeface="+mn-ea"/>
+                          </a:rPr>
+                          <m:t>1</m:t>
+                        </m:r>
+                      </m:num>
+                      <m:den>
+                        <m:rad>
+                          <m:radPr>
+                            <m:ctrlPr>
+                              <a:rPr lang="en-US" altLang="pt-PT" sz="1600" i="1">
+                                <a:solidFill>
+                                  <a:srgbClr val="FF0000"/>
+                                </a:solidFill>
+                                <a:latin typeface="DejaVu Math TeX Gyre" panose="02000503000000000000" charset="0"/>
+                                <a:cs typeface="DejaVu Math TeX Gyre" panose="02000503000000000000" charset="0"/>
+                                <a:sym typeface="+mn-ea"/>
+                              </a:rPr>
+                            </m:ctrlPr>
+                          </m:radPr>
+                          <m:deg>
+                            <m:r>
+                              <a:rPr lang="en-US" altLang="pt-PT" sz="1600" i="1">
+                                <a:solidFill>
+                                  <a:srgbClr val="FF0000"/>
+                                </a:solidFill>
+                                <a:latin typeface="DejaVu Math TeX Gyre" panose="02000503000000000000" charset="0"/>
+                                <a:cs typeface="DejaVu Math TeX Gyre" panose="02000503000000000000" charset="0"/>
+                                <a:sym typeface="+mn-ea"/>
+                              </a:rPr>
+                              <m:t>2</m:t>
+                            </m:r>
+                          </m:deg>
+                          <m:e>
+                            <m:r>
+                              <a:rPr lang="en-US" altLang="pt-PT" sz="1600" i="1">
+                                <a:solidFill>
+                                  <a:srgbClr val="FF0000"/>
+                                </a:solidFill>
+                                <a:latin typeface="DejaVu Math TeX Gyre" panose="02000503000000000000" charset="0"/>
+                                <a:cs typeface="DejaVu Math TeX Gyre" panose="02000503000000000000" charset="0"/>
+                                <a:sym typeface="+mn-ea"/>
+                              </a:rPr>
+                              <m:t>𝑁</m:t>
+                            </m:r>
+                          </m:e>
+                        </m:rad>
+                      </m:den>
+                    </m:f>
+                  </m:oMath>
+                </a14:m>
+                <a:endParaRPr lang="en-US" sz="1600" i="1">
+                  <a:solidFill>
+                    <a:srgbClr val="FF0000"/>
+                  </a:solidFill>
+                  <a:latin typeface="DejaVu Math TeX Gyre" panose="02000503000000000000" charset="0"/>
+                  <a:cs typeface="DejaVu Math TeX Gyre" panose="02000503000000000000" charset="0"/>
+                </a:endParaRPr>
+              </a:p>
+              <a:p>
+                <a:pPr marL="285750" lvl="0" indent="-285750" algn="just">
+                  <a:lnSpc>
+                    <a:spcPct val="150000"/>
+                  </a:lnSpc>
+                  <a:buFont typeface="Arial" panose="020B0604020202020204" pitchFamily="34" charset="0"/>
+                  <a:buChar char="•"/>
+                </a:pPr>
+                <a:r>
+                  <a:rPr lang="pt-PT" altLang="en-US" sz="1600">
+                    <a:solidFill>
+                      <a:srgbClr val="FF0000"/>
+                    </a:solidFill>
+                    <a:sym typeface="+mn-ea"/>
+                  </a:rPr>
+                  <a:t> Para calcular a adaptabilidade do </a:t>
+                </a:r>
+                <a14:m>
+                  <m:oMath xmlns:m="http://schemas.openxmlformats.org/officeDocument/2006/math">
+                    <m:sSup>
+                      <m:sSupPr>
+                        <m:ctrlPr>
+                          <a:rPr lang="en-US" sz="1600" i="1">
+                            <a:solidFill>
+                              <a:srgbClr val="FF0000"/>
+                            </a:solidFill>
+                            <a:latin typeface="DejaVu Math TeX Gyre" panose="02000503000000000000" charset="0"/>
+                            <a:cs typeface="DejaVu Math TeX Gyre" panose="02000503000000000000" charset="0"/>
+                          </a:rPr>
+                        </m:ctrlPr>
+                      </m:sSupPr>
+                      <m:e>
+                        <m:r>
+                          <a:rPr lang="en-US" sz="1600" i="1">
+                            <a:solidFill>
+                              <a:srgbClr val="FF0000"/>
+                            </a:solidFill>
+                            <a:latin typeface="DejaVu Math TeX Gyre" panose="02000503000000000000" charset="0"/>
+                            <a:cs typeface="DejaVu Math TeX Gyre" panose="02000503000000000000" charset="0"/>
+                          </a:rPr>
+                          <m:t>𝜌</m:t>
+                        </m:r>
+                      </m:e>
+                      <m:sup>
+                        <m:r>
+                          <a:rPr lang="en-US" sz="1600" i="1">
+                            <a:solidFill>
+                              <a:srgbClr val="FF0000"/>
+                            </a:solidFill>
+                            <a:latin typeface="DejaVu Math TeX Gyre" panose="02000503000000000000" charset="0"/>
+                            <a:cs typeface="DejaVu Math TeX Gyre" panose="02000503000000000000" charset="0"/>
+                          </a:rPr>
+                          <m:t>’</m:t>
+                        </m:r>
+                      </m:sup>
+                    </m:sSup>
+                  </m:oMath>
+                </a14:m>
+                <a:r>
+                  <a:rPr lang="pt-PT" altLang="en-US" sz="1600">
+                    <a:solidFill>
+                      <a:srgbClr val="FF0000"/>
+                    </a:solidFill>
+                    <a:sym typeface="+mn-ea"/>
+                  </a:rPr>
+                  <a:t>, perturba todas as variáveis de uma só vez com </a:t>
+                </a:r>
+                <a14:m>
+                  <m:oMath xmlns:m="http://schemas.openxmlformats.org/officeDocument/2006/math">
+                    <m:sSubSup>
+                      <m:sSubSupPr>
+                        <m:ctrlPr>
+                          <a:rPr lang="en-US" sz="1600" i="1">
+                            <a:solidFill>
+                              <a:srgbClr val="FF0000"/>
+                            </a:solidFill>
+                            <a:latin typeface="DejaVu Math TeX Gyre" panose="02000503000000000000" charset="0"/>
+                            <a:cs typeface="DejaVu Math TeX Gyre" panose="02000503000000000000" charset="0"/>
+                          </a:rPr>
+                        </m:ctrlPr>
+                      </m:sSubSupPr>
+                      <m:e>
+                        <m:r>
+                          <a:rPr lang="en-US" sz="1600" i="1">
+                            <a:solidFill>
+                              <a:srgbClr val="FF0000"/>
+                            </a:solidFill>
+                            <a:latin typeface="DejaVu Math TeX Gyre" panose="02000503000000000000" charset="0"/>
+                            <a:cs typeface="DejaVu Math TeX Gyre" panose="02000503000000000000" charset="0"/>
+                          </a:rPr>
+                          <m:t>𝑥</m:t>
+                        </m:r>
+                      </m:e>
+                      <m:sub>
+                        <m:r>
+                          <a:rPr lang="en-US" sz="1600" i="1">
+                            <a:solidFill>
+                              <a:srgbClr val="FF0000"/>
+                            </a:solidFill>
+                            <a:latin typeface="DejaVu Math TeX Gyre" panose="02000503000000000000" charset="0"/>
+                            <a:cs typeface="DejaVu Math TeX Gyre" panose="02000503000000000000" charset="0"/>
+                          </a:rPr>
+                          <m:t>𝑖</m:t>
+                        </m:r>
+                      </m:sub>
+                      <m:sup>
+                        <m:r>
+                          <a:rPr lang="en-US" sz="1600" i="1">
+                            <a:solidFill>
+                              <a:srgbClr val="FF0000"/>
+                            </a:solidFill>
+                            <a:latin typeface="DejaVu Math TeX Gyre" panose="02000503000000000000" charset="0"/>
+                            <a:cs typeface="DejaVu Math TeX Gyre" panose="02000503000000000000" charset="0"/>
+                          </a:rPr>
+                          <m:t>’</m:t>
+                        </m:r>
+                      </m:sup>
+                    </m:sSubSup>
+                    <m:r>
+                      <a:rPr lang="en-US" sz="1600" i="1">
+                        <a:solidFill>
+                          <a:srgbClr val="FF0000"/>
+                        </a:solidFill>
+                        <a:latin typeface="DejaVu Math TeX Gyre" panose="02000503000000000000" charset="0"/>
+                        <a:cs typeface="DejaVu Math TeX Gyre" panose="02000503000000000000" charset="0"/>
+                      </a:rPr>
+                      <m:t>=</m:t>
+                    </m:r>
+                    <m:sSub>
+                      <m:sSubPr>
+                        <m:ctrlPr>
+                          <a:rPr lang="en-US" sz="1600" i="1">
+                            <a:solidFill>
+                              <a:srgbClr val="FF0000"/>
+                            </a:solidFill>
+                            <a:latin typeface="DejaVu Math TeX Gyre" panose="02000503000000000000" charset="0"/>
+                            <a:cs typeface="DejaVu Math TeX Gyre" panose="02000503000000000000" charset="0"/>
+                          </a:rPr>
+                        </m:ctrlPr>
+                      </m:sSubPr>
+                      <m:e>
+                        <m:r>
+                          <a:rPr lang="en-US" sz="1600" i="1">
+                            <a:solidFill>
+                              <a:srgbClr val="FF0000"/>
+                            </a:solidFill>
+                            <a:latin typeface="DejaVu Math TeX Gyre" panose="02000503000000000000" charset="0"/>
+                            <a:cs typeface="DejaVu Math TeX Gyre" panose="02000503000000000000" charset="0"/>
+                          </a:rPr>
+                          <m:t>𝑥</m:t>
+                        </m:r>
+                      </m:e>
+                      <m:sub>
+                        <m:r>
+                          <a:rPr lang="en-US" sz="1600" i="1">
+                            <a:solidFill>
+                              <a:srgbClr val="FF0000"/>
+                            </a:solidFill>
+                            <a:latin typeface="DejaVu Math TeX Gyre" panose="02000503000000000000" charset="0"/>
+                            <a:cs typeface="DejaVu Math TeX Gyre" panose="02000503000000000000" charset="0"/>
+                          </a:rPr>
+                          <m:t>𝑖</m:t>
+                        </m:r>
+                      </m:sub>
+                    </m:sSub>
+                    <m:r>
+                      <a:rPr lang="en-US" sz="1600" i="1">
+                        <a:solidFill>
+                          <a:srgbClr val="FF0000"/>
+                        </a:solidFill>
+                        <a:latin typeface="DejaVu Math TeX Gyre" panose="02000503000000000000" charset="0"/>
+                        <a:cs typeface="DejaVu Math TeX Gyre" panose="02000503000000000000" charset="0"/>
+                      </a:rPr>
+                      <m:t>+</m:t>
+                    </m:r>
+                    <m:r>
+                      <a:rPr lang="en-US" sz="1600" i="1">
+                        <a:solidFill>
+                          <a:srgbClr val="FF0000"/>
+                        </a:solidFill>
+                        <a:latin typeface="DejaVu Math TeX Gyre" panose="02000503000000000000" charset="0"/>
+                        <a:cs typeface="DejaVu Math TeX Gyre" panose="02000503000000000000" charset="0"/>
+                      </a:rPr>
+                      <m:t>𝑁</m:t>
+                    </m:r>
+                    <m:r>
+                      <a:rPr lang="en-US" sz="1600" i="1">
+                        <a:solidFill>
+                          <a:srgbClr val="FF0000"/>
+                        </a:solidFill>
+                        <a:latin typeface="DejaVu Math TeX Gyre" panose="02000503000000000000" charset="0"/>
+                        <a:cs typeface="DejaVu Math TeX Gyre" panose="02000503000000000000" charset="0"/>
+                      </a:rPr>
+                      <m:t>(</m:t>
+                    </m:r>
+                    <m:r>
+                      <a:rPr lang="en-US" sz="1600" i="1">
+                        <a:solidFill>
+                          <a:srgbClr val="FF0000"/>
+                        </a:solidFill>
+                        <a:latin typeface="DejaVu Math TeX Gyre" panose="02000503000000000000" charset="0"/>
+                        <a:cs typeface="DejaVu Math TeX Gyre" panose="02000503000000000000" charset="0"/>
+                      </a:rPr>
+                      <m:t>0</m:t>
+                    </m:r>
+                    <m:r>
+                      <a:rPr lang="en-US" sz="1600" i="1">
+                        <a:solidFill>
+                          <a:srgbClr val="FF0000"/>
+                        </a:solidFill>
+                        <a:latin typeface="DejaVu Math TeX Gyre" panose="02000503000000000000" charset="0"/>
+                        <a:cs typeface="DejaVu Math TeX Gyre" panose="02000503000000000000" charset="0"/>
+                      </a:rPr>
+                      <m:t>,</m:t>
+                    </m:r>
+                    <m:r>
+                      <a:rPr lang="en-US" sz="1600" i="1">
+                        <a:solidFill>
+                          <a:srgbClr val="FF0000"/>
+                        </a:solidFill>
+                        <a:latin typeface="DejaVu Math TeX Gyre" panose="02000503000000000000" charset="0"/>
+                        <a:cs typeface="DejaVu Math TeX Gyre" panose="02000503000000000000" charset="0"/>
+                      </a:rPr>
+                      <m:t>𝜎</m:t>
+                    </m:r>
+                    <m:r>
+                      <a:rPr lang="en-US" sz="1600" i="1">
+                        <a:solidFill>
+                          <a:srgbClr val="FF0000"/>
+                        </a:solidFill>
+                        <a:latin typeface="DejaVu Math TeX Gyre" panose="02000503000000000000" charset="0"/>
+                        <a:ea typeface="MS Mincho" charset="0"/>
+                        <a:cs typeface="DejaVu Math TeX Gyre" panose="02000503000000000000" charset="0"/>
+                      </a:rPr>
+                      <m:t>)</m:t>
+                    </m:r>
+                  </m:oMath>
+                </a14:m>
+                <a:r>
+                  <a:rPr lang="pt-PT" altLang="en-US" sz="1600">
+                    <a:solidFill>
+                      <a:srgbClr val="FF0000"/>
+                    </a:solidFill>
+                    <a:latin typeface="DejaVu Math TeX Gyre" panose="02000503000000000000" charset="0"/>
+                    <a:ea typeface="MS Mincho" charset="0"/>
+                    <a:cs typeface="DejaVu Math TeX Gyre" panose="02000503000000000000" charset="0"/>
+                  </a:rPr>
+                  <a:t>, </a:t>
+                </a:r>
+                <a:r>
+                  <a:rPr lang="pt-PT" altLang="en-US" sz="1600">
+                    <a:solidFill>
+                      <a:srgbClr val="FF0000"/>
+                    </a:solidFill>
+                    <a:sym typeface="+mn-ea"/>
+                  </a:rPr>
+                  <a:t>onde </a:t>
+                </a:r>
+                <a14:m>
+                  <m:oMath xmlns:m="http://schemas.openxmlformats.org/officeDocument/2006/math">
+                    <m:r>
+                      <a:rPr lang="en-US" altLang="pt-PT" sz="1600" i="1">
+                        <a:solidFill>
+                          <a:srgbClr val="FF0000"/>
+                        </a:solidFill>
+                        <a:latin typeface="DejaVu Math TeX Gyre" panose="02000503000000000000" charset="0"/>
+                        <a:cs typeface="DejaVu Math TeX Gyre" panose="02000503000000000000" charset="0"/>
+                        <a:sym typeface="+mn-ea"/>
+                      </a:rPr>
+                      <m:t>𝜎</m:t>
+                    </m:r>
+                    <m:r>
+                      <a:rPr lang="en-US" altLang="pt-PT" sz="1600" i="1">
+                        <a:solidFill>
+                          <a:srgbClr val="FF0000"/>
+                        </a:solidFill>
+                        <a:latin typeface="DejaVu Math TeX Gyre" panose="02000503000000000000" charset="0"/>
+                        <a:cs typeface="DejaVu Math TeX Gyre" panose="02000503000000000000" charset="0"/>
+                        <a:sym typeface="+mn-ea"/>
+                      </a:rPr>
+                      <m:t>=</m:t>
+                    </m:r>
+                    <m:r>
+                      <a:rPr lang="en-US" altLang="pt-PT" sz="1600" i="1">
+                        <a:solidFill>
+                          <a:srgbClr val="FF0000"/>
+                        </a:solidFill>
+                        <a:latin typeface="DejaVu Math TeX Gyre" panose="02000503000000000000" charset="0"/>
+                        <a:cs typeface="DejaVu Math TeX Gyre" panose="02000503000000000000" charset="0"/>
+                        <a:sym typeface="+mn-ea"/>
+                      </a:rPr>
+                      <m:t>𝜌</m:t>
+                    </m:r>
+                    <m:r>
+                      <a:rPr lang="en-US" altLang="pt-PT" sz="1600" i="1">
+                        <a:solidFill>
+                          <a:srgbClr val="FF0000"/>
+                        </a:solidFill>
+                        <a:latin typeface="DejaVu Math TeX Gyre" panose="02000503000000000000" charset="0"/>
+                        <a:cs typeface="DejaVu Math TeX Gyre" panose="02000503000000000000" charset="0"/>
+                        <a:sym typeface="+mn-ea"/>
+                      </a:rPr>
+                      <m:t>’∙∆</m:t>
+                    </m:r>
+                    <m:r>
+                      <a:rPr lang="en-US" altLang="pt-PT" sz="1600" i="1">
+                        <a:solidFill>
+                          <a:srgbClr val="FF0000"/>
+                        </a:solidFill>
+                        <a:latin typeface="DejaVu Math TeX Gyre" panose="02000503000000000000" charset="0"/>
+                        <a:cs typeface="DejaVu Math TeX Gyre" panose="02000503000000000000" charset="0"/>
+                        <a:sym typeface="+mn-ea"/>
+                      </a:rPr>
+                      <m:t>𝑥</m:t>
+                    </m:r>
+                    <m:r>
+                      <a:rPr lang="en-US" altLang="pt-PT" sz="1600" i="1" baseline="-25000">
+                        <a:solidFill>
+                          <a:srgbClr val="FF0000"/>
+                        </a:solidFill>
+                        <a:latin typeface="DejaVu Math TeX Gyre" panose="02000503000000000000" charset="0"/>
+                        <a:cs typeface="DejaVu Math TeX Gyre" panose="02000503000000000000" charset="0"/>
+                        <a:sym typeface="+mn-ea"/>
+                      </a:rPr>
+                      <m:t>𝑖</m:t>
+                    </m:r>
+                  </m:oMath>
+                </a14:m>
+                <a:r>
+                  <a:rPr lang="pt-PT" altLang="en-US" sz="1600">
+                    <a:solidFill>
+                      <a:srgbClr val="FF0000"/>
+                    </a:solidFill>
+                    <a:sym typeface="+mn-ea"/>
+                  </a:rPr>
+                  <a:t>, e calcula o valor de f(x).</a:t>
+                </a:r>
+                <a:endParaRPr lang="pt-PT" altLang="en-US" sz="1600">
+                  <a:solidFill>
+                    <a:srgbClr val="FF0000"/>
+                  </a:solidFill>
+                  <a:sym typeface="+mn-ea"/>
+                </a:endParaRPr>
+              </a:p>
+              <a:p>
+                <a:pPr marL="285750" lvl="0" indent="-285750" algn="just">
+                  <a:lnSpc>
+                    <a:spcPct val="150000"/>
+                  </a:lnSpc>
+                  <a:buFont typeface="Arial" panose="020B0604020202020204" pitchFamily="34" charset="0"/>
+                  <a:buChar char="•"/>
+                </a:pPr>
+                <a:r>
+                  <a:rPr lang="pt-PT" altLang="en-US" sz="1600">
+                    <a:sym typeface="+mn-ea"/>
+                  </a:rPr>
+                  <a:t>Foram geradas</a:t>
+                </a:r>
+                <a:r>
+                  <a:rPr lang="pt-PT" altLang="en-US" sz="1600">
+                    <a:solidFill>
+                      <a:schemeClr val="accent5"/>
+                    </a:solidFill>
+                    <a:sym typeface="+mn-ea"/>
+                  </a:rPr>
+                  <a:t> N+1 </a:t>
+                </a:r>
+                <a:r>
+                  <a:rPr lang="pt-PT" altLang="en-US" sz="1600">
+                    <a:sym typeface="+mn-ea"/>
+                  </a:rPr>
+                  <a:t>perturbações para serem escolhidas.</a:t>
+                </a:r>
+                <a:endParaRPr lang="pt-PT" altLang="en-US" sz="1600"/>
+              </a:p>
+              <a:p>
+                <a:pPr marL="285750" indent="-285750" algn="just">
+                  <a:lnSpc>
+                    <a:spcPct val="150000"/>
+                  </a:lnSpc>
+                  <a:buFont typeface="Arial" panose="020B0604020202020204" pitchFamily="34" charset="0"/>
+                  <a:buChar char="•"/>
+                </a:pPr>
+                <a:r>
+                  <a:rPr lang="pt-PT" altLang="en-US" sz="1600">
+                    <a:sym typeface="+mn-ea"/>
+                  </a:rPr>
+                  <a:t>Ordena pelo f(x) e escolhe uma perturbação para ser confirmada.</a:t>
+                </a:r>
+                <a:endParaRPr lang="pt-PT" altLang="en-US" sz="1600">
+                  <a:sym typeface="+mn-ea"/>
+                </a:endParaRPr>
+              </a:p>
+            </p:txBody>
+          </p:sp>
+        </mc:Choice>
+        <mc:Fallback>
+          <p:sp>
+            <p:nvSpPr>
+              <p:cNvPr id="27" name="Text Box 26"/>
+              <p:cNvSpPr txBox="1">
+                <a:spLocks noRot="1" noChangeAspect="1" noMove="1" noResize="1" noEditPoints="1" noAdjustHandles="1" noChangeArrowheads="1" noChangeShapeType="1" noTextEdit="1"/>
+              </p:cNvSpPr>
+              <p:nvPr/>
+            </p:nvSpPr>
+            <p:spPr>
+              <a:xfrm>
+                <a:off x="2619375" y="906780"/>
+                <a:ext cx="6953250" cy="5044440"/>
+              </a:xfrm>
+              <a:prstGeom prst="rect">
+                <a:avLst/>
+              </a:prstGeom>
+              <a:blipFill rotWithShape="1">
+                <a:blip r:embed="rId1"/>
+                <a:stretch>
+                  <a:fillRect/>
+                </a:stretch>
+              </a:blipFill>
+            </p:spPr>
+            <p:txBody>
+              <a:bodyPr/>
+              <a:lstStyle/>
+              <a:p>
+                <a:r>
+                  <a:rPr lang="en-US" altLang="en-US">
+                    <a:noFill/>
+                  </a:rPr>
+                  <a:t> </a:t>
+                </a:r>
+              </a:p>
+            </p:txBody>
+          </p:sp>
+        </mc:Fallback>
+      </mc:AlternateContent>
+      <p:sp>
+        <p:nvSpPr>
+          <p:cNvPr id="2" name="Text Box 1"/>
+          <p:cNvSpPr txBox="1"/>
+          <p:nvPr/>
+        </p:nvSpPr>
+        <p:spPr>
+          <a:xfrm>
+            <a:off x="485775" y="27940"/>
+            <a:ext cx="11220450" cy="414020"/>
+          </a:xfrm>
+          <a:prstGeom prst="rect">
+            <a:avLst/>
+          </a:prstGeom>
+          <a:noFill/>
+        </p:spPr>
+        <p:txBody>
+          <a:bodyPr wrap="square" rtlCol="0">
+            <a:spAutoFit/>
+          </a:bodyPr>
+          <a:p>
+            <a:pPr lvl="0" indent="0" algn="ctr">
+              <a:lnSpc>
+                <a:spcPct val="150000"/>
+              </a:lnSpc>
+              <a:buFont typeface="Arial" panose="020B0604020202020204" pitchFamily="34" charset="0"/>
+              <a:buNone/>
+            </a:pPr>
+            <a:r>
+              <a:rPr lang="pt-PT" sz="1400" b="1">
+                <a:solidFill>
+                  <a:schemeClr val="accent2"/>
+                </a:solidFill>
+              </a:rPr>
+              <a:t>ALTERNATIVA 1</a:t>
+            </a:r>
+            <a:endParaRPr lang="pt-PT" sz="1400" b="1">
+              <a:solidFill>
+                <a:schemeClr val="accent2"/>
+              </a:solidFill>
+            </a:endParaRPr>
+          </a:p>
+        </p:txBody>
+      </p:sp>
+    </p:spTree>
+  </p:cSld>
+  <p:clrMapOvr>
+    <a:masterClrMapping/>
+  </p:clrMapOvr>
+</p:sld>
+</file>
+
+<file path=ppt/slides/slide4.xml><?xml version="1.0" encoding="utf-8"?>
+<p:sld xmlns:a="http://schemas.openxmlformats.org/drawingml/2006/main" xmlns:r="http://schemas.openxmlformats.org/officeDocument/2006/relationships" xmlns:p="http://schemas.openxmlformats.org/presentationml/2006/main">
+  <p:cSld>
+    <p:spTree>
+      <p:nvGrpSpPr>
+        <p:cNvPr id="1" name=""/>
+        <p:cNvGrpSpPr/>
+        <p:nvPr/>
+      </p:nvGrpSpPr>
+      <p:grpSpPr/>
+      <p:pic>
+        <p:nvPicPr>
+          <p:cNvPr id="3" name="Picture 2"/>
+          <p:cNvPicPr>
+            <a:picLocks noChangeAspect="1"/>
+          </p:cNvPicPr>
+          <p:nvPr/>
+        </p:nvPicPr>
+        <p:blipFill>
+          <a:blip r:embed="rId1"/>
+          <a:stretch>
+            <a:fillRect/>
+          </a:stretch>
+        </p:blipFill>
+        <p:spPr>
+          <a:xfrm>
+            <a:off x="1583055" y="1727200"/>
+            <a:ext cx="8360410" cy="3629025"/>
+          </a:xfrm>
+          <a:prstGeom prst="rect">
+            <a:avLst/>
+          </a:prstGeom>
+        </p:spPr>
+      </p:pic>
+      <mc:AlternateContent xmlns:mc="http://schemas.openxmlformats.org/markup-compatibility/2006">
+        <mc:Choice xmlns:a14="http://schemas.microsoft.com/office/drawing/2010/main" Requires="a14">
+          <p:sp>
+            <p:nvSpPr>
+              <p:cNvPr id="4" name="Text Box 3"/>
+              <p:cNvSpPr txBox="1"/>
+              <p:nvPr/>
+            </p:nvSpPr>
+            <p:spPr>
+              <a:xfrm>
+                <a:off x="1046480" y="763270"/>
+                <a:ext cx="3221355" cy="376555"/>
+              </a:xfrm>
+              <a:prstGeom prst="rect">
+                <a:avLst/>
+              </a:prstGeom>
+              <a:noFill/>
+            </p:spPr>
+            <p:txBody>
+              <a:bodyPr wrap="none" rtlCol="0" anchor="t">
+                <a:spAutoFit/>
+              </a:bodyPr>
+              <a:p>
+                <a14:m>
+                  <m:oMathPara xmlns:m="http://schemas.openxmlformats.org/officeDocument/2006/math">
+                    <m:oMathParaPr>
+                      <m:jc m:val="centerGroup"/>
+                    </m:oMathParaPr>
+                    <m:oMath xmlns:m="http://schemas.openxmlformats.org/officeDocument/2006/math">
+                      <m:sSup>
+                        <m:sSupPr>
+                          <m:ctrlPr>
+                            <a:rPr lang="en-US" i="1">
+                              <a:solidFill>
+                                <a:schemeClr val="tx1"/>
+                              </a:solidFill>
+                              <a:latin typeface="DejaVu Math TeX Gyre" panose="02000503000000000000" charset="0"/>
+                              <a:cs typeface="DejaVu Math TeX Gyre" panose="02000503000000000000" charset="0"/>
+                            </a:rPr>
+                          </m:ctrlPr>
+                        </m:sSupPr>
+                        <m:e>
+                          <m:r>
+                            <a:rPr lang="en-US" i="1">
+                              <a:solidFill>
+                                <a:schemeClr val="tx1"/>
+                              </a:solidFill>
+                              <a:latin typeface="DejaVu Math TeX Gyre" panose="02000503000000000000" charset="0"/>
+                              <a:cs typeface="DejaVu Math TeX Gyre" panose="02000503000000000000" charset="0"/>
+                            </a:rPr>
+                            <m:t>𝜌</m:t>
+                          </m:r>
+                        </m:e>
+                        <m:sup>
+                          <m:r>
+                            <a:rPr lang="en-US" i="1">
+                              <a:solidFill>
+                                <a:schemeClr val="tx1"/>
+                              </a:solidFill>
+                              <a:latin typeface="DejaVu Math TeX Gyre" panose="02000503000000000000" charset="0"/>
+                              <a:cs typeface="DejaVu Math TeX Gyre" panose="02000503000000000000" charset="0"/>
+                            </a:rPr>
+                            <m:t>’</m:t>
+                          </m:r>
+                        </m:sup>
+                      </m:sSup>
+                      <m:r>
+                        <a:rPr lang="en-US" i="1">
+                          <a:solidFill>
+                            <a:schemeClr val="tx1"/>
+                          </a:solidFill>
+                          <a:latin typeface="DejaVu Math TeX Gyre" panose="02000503000000000000" charset="0"/>
+                          <a:cs typeface="DejaVu Math TeX Gyre" panose="02000503000000000000" charset="0"/>
+                        </a:rPr>
+                        <m:t>=</m:t>
+                      </m:r>
+                      <m:r>
+                        <a:rPr lang="en-US" i="1">
+                          <a:solidFill>
+                            <a:schemeClr val="tx1"/>
+                          </a:solidFill>
+                          <a:latin typeface="DejaVu Math TeX Gyre" panose="02000503000000000000" charset="0"/>
+                          <a:cs typeface="DejaVu Math TeX Gyre" panose="02000503000000000000" charset="0"/>
+                        </a:rPr>
+                        <m:t>𝜌</m:t>
+                      </m:r>
+                      <m:r>
+                        <a:rPr lang="en-US" i="1">
+                          <a:solidFill>
+                            <a:schemeClr val="tx1"/>
+                          </a:solidFill>
+                          <a:latin typeface="DejaVu Math TeX Gyre" panose="02000503000000000000" charset="0"/>
+                          <a:cs typeface="DejaVu Math TeX Gyre" panose="02000503000000000000" charset="0"/>
+                        </a:rPr>
+                        <m:t>∙</m:t>
+                      </m:r>
+                      <m:r>
+                        <a:rPr lang="en-US" i="1">
+                          <a:solidFill>
+                            <a:schemeClr val="tx1"/>
+                          </a:solidFill>
+                          <a:latin typeface="DejaVu Math TeX Gyre" panose="02000503000000000000" charset="0"/>
+                          <a:cs typeface="DejaVu Math TeX Gyre" panose="02000503000000000000" charset="0"/>
+                        </a:rPr>
+                        <m:t>𝐿𝑜𝑔𝑁𝑜𝑟𝑚𝑎𝑙</m:t>
+                      </m:r>
+                      <m:r>
+                        <a:rPr lang="en-US" i="1">
+                          <a:solidFill>
+                            <a:schemeClr val="tx1"/>
+                          </a:solidFill>
+                          <a:latin typeface="DejaVu Math TeX Gyre" panose="02000503000000000000" charset="0"/>
+                          <a:cs typeface="DejaVu Math TeX Gyre" panose="02000503000000000000" charset="0"/>
+                        </a:rPr>
+                        <m:t>(</m:t>
+                      </m:r>
+                      <m:r>
+                        <a:rPr lang="en-US" i="1">
+                          <a:solidFill>
+                            <a:schemeClr val="tx1"/>
+                          </a:solidFill>
+                          <a:latin typeface="DejaVu Math TeX Gyre" panose="02000503000000000000" charset="0"/>
+                          <a:cs typeface="DejaVu Math TeX Gyre" panose="02000503000000000000" charset="0"/>
+                        </a:rPr>
+                        <m:t>0</m:t>
+                      </m:r>
+                      <m:r>
+                        <a:rPr lang="en-US" i="1">
+                          <a:solidFill>
+                            <a:schemeClr val="tx1"/>
+                          </a:solidFill>
+                          <a:latin typeface="DejaVu Math TeX Gyre" panose="02000503000000000000" charset="0"/>
+                          <a:cs typeface="DejaVu Math TeX Gyre" panose="02000503000000000000" charset="0"/>
+                        </a:rPr>
+                        <m:t>,</m:t>
+                      </m:r>
+                      <m:r>
+                        <a:rPr lang="en-US" i="1">
+                          <a:solidFill>
+                            <a:schemeClr val="tx1"/>
+                          </a:solidFill>
+                          <a:latin typeface="DejaVu Math TeX Gyre" panose="02000503000000000000" charset="0"/>
+                          <a:cs typeface="DejaVu Math TeX Gyre" panose="02000503000000000000" charset="0"/>
+                        </a:rPr>
+                        <m:t>𝛼</m:t>
+                      </m:r>
+                      <m:r>
+                        <a:rPr lang="en-US" i="1">
+                          <a:solidFill>
+                            <a:schemeClr val="tx1"/>
+                          </a:solidFill>
+                          <a:latin typeface="DejaVu Math TeX Gyre" panose="02000503000000000000" charset="0"/>
+                          <a:ea typeface="MS Mincho" charset="0"/>
+                          <a:cs typeface="DejaVu Math TeX Gyre" panose="02000503000000000000" charset="0"/>
+                        </a:rPr>
+                        <m:t>)</m:t>
+                      </m:r>
+                    </m:oMath>
+                  </m:oMathPara>
+                </a14:m>
+                <a:endParaRPr lang="en-US" i="1">
+                  <a:solidFill>
+                    <a:schemeClr val="tx1"/>
+                  </a:solidFill>
+                  <a:latin typeface="DejaVu Math TeX Gyre" panose="02000503000000000000" charset="0"/>
+                  <a:ea typeface="MS Mincho" charset="0"/>
+                  <a:cs typeface="DejaVu Math TeX Gyre" panose="02000503000000000000" charset="0"/>
+                </a:endParaRPr>
+              </a:p>
+            </p:txBody>
+          </p:sp>
+        </mc:Choice>
+        <mc:Fallback>
+          <p:sp>
+            <p:nvSpPr>
+              <p:cNvPr id="4" name="Text Box 3"/>
+              <p:cNvSpPr txBox="1">
+                <a:spLocks noRot="1" noChangeAspect="1" noMove="1" noResize="1" noEditPoints="1" noAdjustHandles="1" noChangeArrowheads="1" noChangeShapeType="1" noTextEdit="1"/>
+              </p:cNvSpPr>
+              <p:nvPr/>
+            </p:nvSpPr>
+            <p:spPr>
+              <a:xfrm>
+                <a:off x="1046480" y="763270"/>
+                <a:ext cx="3221355" cy="376555"/>
+              </a:xfrm>
+              <a:prstGeom prst="rect">
+                <a:avLst/>
+              </a:prstGeom>
+              <a:blipFill rotWithShape="1">
+                <a:blip r:embed="rId2"/>
+                <a:stretch>
+                  <a:fillRect/>
+                </a:stretch>
+              </a:blipFill>
+            </p:spPr>
+            <p:txBody>
+              <a:bodyPr/>
+              <a:lstStyle/>
+              <a:p>
+                <a:r>
+                  <a:rPr lang="en-US" altLang="en-US">
+                    <a:noFill/>
+                  </a:rPr>
+                  <a:t> </a:t>
+                </a:r>
+              </a:p>
+            </p:txBody>
+          </p:sp>
+        </mc:Fallback>
+      </mc:AlternateContent>
+      <mc:AlternateContent xmlns:mc="http://schemas.openxmlformats.org/markup-compatibility/2006">
+        <mc:Choice xmlns:a14="http://schemas.microsoft.com/office/drawing/2010/main" Requires="a14">
+          <p:sp>
+            <p:nvSpPr>
+              <p:cNvPr id="5" name="Text Box 4"/>
+              <p:cNvSpPr txBox="1"/>
+              <p:nvPr/>
+            </p:nvSpPr>
+            <p:spPr>
+              <a:xfrm>
+                <a:off x="7291705" y="1131570"/>
+                <a:ext cx="3216275" cy="376555"/>
+              </a:xfrm>
+              <a:prstGeom prst="rect">
+                <a:avLst/>
+              </a:prstGeom>
+              <a:noFill/>
+            </p:spPr>
+            <p:txBody>
+              <a:bodyPr wrap="none" rtlCol="0" anchor="t">
+                <a:spAutoFit/>
+              </a:bodyPr>
+              <a:p>
+                <a14:m>
+                  <m:oMathPara xmlns:m="http://schemas.openxmlformats.org/officeDocument/2006/math">
+                    <m:oMathParaPr>
+                      <m:jc m:val="centerGroup"/>
+                    </m:oMathParaPr>
+                    <m:oMath xmlns:m="http://schemas.openxmlformats.org/officeDocument/2006/math">
+                      <m:sSup>
+                        <m:sSupPr>
+                          <m:ctrlPr>
+                            <a:rPr lang="en-US" i="1">
+                              <a:solidFill>
+                                <a:schemeClr val="tx1"/>
+                              </a:solidFill>
+                              <a:latin typeface="DejaVu Math TeX Gyre" panose="02000503000000000000" charset="0"/>
+                              <a:cs typeface="DejaVu Math TeX Gyre" panose="02000503000000000000" charset="0"/>
+                            </a:rPr>
+                          </m:ctrlPr>
+                        </m:sSupPr>
+                        <m:e>
+                          <m:r>
+                            <a:rPr lang="en-US" i="1">
+                              <a:solidFill>
+                                <a:schemeClr val="tx1"/>
+                              </a:solidFill>
+                              <a:latin typeface="DejaVu Math TeX Gyre" panose="02000503000000000000" charset="0"/>
+                              <a:cs typeface="DejaVu Math TeX Gyre" panose="02000503000000000000" charset="0"/>
+                            </a:rPr>
+                            <m:t>𝜌</m:t>
+                          </m:r>
+                        </m:e>
+                        <m:sup>
+                          <m:r>
+                            <a:rPr lang="en-US" i="1">
+                              <a:solidFill>
+                                <a:schemeClr val="tx1"/>
+                              </a:solidFill>
+                              <a:latin typeface="DejaVu Math TeX Gyre" panose="02000503000000000000" charset="0"/>
+                              <a:cs typeface="DejaVu Math TeX Gyre" panose="02000503000000000000" charset="0"/>
+                            </a:rPr>
+                            <m:t>’</m:t>
+                          </m:r>
+                        </m:sup>
+                      </m:sSup>
+                      <m:r>
+                        <a:rPr lang="en-US" i="1">
+                          <a:solidFill>
+                            <a:schemeClr val="tx1"/>
+                          </a:solidFill>
+                          <a:latin typeface="DejaVu Math TeX Gyre" panose="02000503000000000000" charset="0"/>
+                          <a:cs typeface="DejaVu Math TeX Gyre" panose="02000503000000000000" charset="0"/>
+                        </a:rPr>
+                        <m:t>=</m:t>
+                      </m:r>
+                      <m:r>
+                        <a:rPr lang="en-US" i="1">
+                          <a:solidFill>
+                            <a:schemeClr val="tx1"/>
+                          </a:solidFill>
+                          <a:latin typeface="DejaVu Math TeX Gyre" panose="02000503000000000000" charset="0"/>
+                          <a:cs typeface="DejaVu Math TeX Gyre" panose="02000503000000000000" charset="0"/>
+                        </a:rPr>
+                        <m:t>𝐿𝑜𝑔𝑁𝑜𝑟𝑚𝑎𝑙</m:t>
+                      </m:r>
+                      <m:r>
+                        <a:rPr lang="en-US" i="1">
+                          <a:solidFill>
+                            <a:schemeClr val="tx1"/>
+                          </a:solidFill>
+                          <a:latin typeface="DejaVu Math TeX Gyre" panose="02000503000000000000" charset="0"/>
+                          <a:cs typeface="DejaVu Math TeX Gyre" panose="02000503000000000000" charset="0"/>
+                        </a:rPr>
+                        <m:t>(</m:t>
+                      </m:r>
+                      <m:r>
+                        <a:rPr lang="en-US" i="1">
+                          <a:solidFill>
+                            <a:schemeClr val="tx1"/>
+                          </a:solidFill>
+                          <a:latin typeface="DejaVu Math TeX Gyre" panose="02000503000000000000" charset="0"/>
+                          <a:cs typeface="DejaVu Math TeX Gyre" panose="02000503000000000000" charset="0"/>
+                        </a:rPr>
+                        <m:t>1</m:t>
+                      </m:r>
+                      <m:r>
+                        <a:rPr lang="en-US" i="1">
+                          <a:solidFill>
+                            <a:schemeClr val="tx1"/>
+                          </a:solidFill>
+                          <a:latin typeface="DejaVu Math TeX Gyre" panose="02000503000000000000" charset="0"/>
+                          <a:cs typeface="DejaVu Math TeX Gyre" panose="02000503000000000000" charset="0"/>
+                        </a:rPr>
+                        <m:t>, </m:t>
+                      </m:r>
+                      <m:r>
+                        <a:rPr lang="en-US" i="1">
+                          <a:solidFill>
+                            <a:schemeClr val="tx1"/>
+                          </a:solidFill>
+                          <a:latin typeface="DejaVu Math TeX Gyre" panose="02000503000000000000" charset="0"/>
+                          <a:cs typeface="DejaVu Math TeX Gyre" panose="02000503000000000000" charset="0"/>
+                        </a:rPr>
+                        <m:t>0</m:t>
+                      </m:r>
+                      <m:r>
+                        <a:rPr lang="en-US" i="1">
+                          <a:solidFill>
+                            <a:schemeClr val="tx1"/>
+                          </a:solidFill>
+                          <a:latin typeface="DejaVu Math TeX Gyre" panose="02000503000000000000" charset="0"/>
+                          <a:cs typeface="DejaVu Math TeX Gyre" panose="02000503000000000000" charset="0"/>
+                        </a:rPr>
+                        <m:t>.</m:t>
+                      </m:r>
+                      <m:r>
+                        <a:rPr lang="en-US" i="1">
+                          <a:solidFill>
+                            <a:schemeClr val="tx1"/>
+                          </a:solidFill>
+                          <a:latin typeface="DejaVu Math TeX Gyre" panose="02000503000000000000" charset="0"/>
+                          <a:cs typeface="DejaVu Math TeX Gyre" panose="02000503000000000000" charset="0"/>
+                        </a:rPr>
+                        <m:t>67</m:t>
+                      </m:r>
+                      <m:r>
+                        <a:rPr lang="en-US" i="1">
+                          <a:solidFill>
+                            <a:schemeClr val="tx1"/>
+                          </a:solidFill>
+                          <a:latin typeface="DejaVu Math TeX Gyre" panose="02000503000000000000" charset="0"/>
+                          <a:ea typeface="MS Mincho" charset="0"/>
+                          <a:cs typeface="DejaVu Math TeX Gyre" panose="02000503000000000000" charset="0"/>
+                        </a:rPr>
+                        <m:t>)</m:t>
+                      </m:r>
+                    </m:oMath>
+                  </m:oMathPara>
+                </a14:m>
+                <a:endParaRPr lang="en-US" i="1">
+                  <a:solidFill>
+                    <a:schemeClr val="tx1"/>
+                  </a:solidFill>
+                  <a:latin typeface="DejaVu Math TeX Gyre" panose="02000503000000000000" charset="0"/>
+                  <a:ea typeface="MS Mincho" charset="0"/>
+                  <a:cs typeface="DejaVu Math TeX Gyre" panose="02000503000000000000" charset="0"/>
+                </a:endParaRPr>
+              </a:p>
+            </p:txBody>
+          </p:sp>
+        </mc:Choice>
+        <mc:Fallback>
+          <p:sp>
+            <p:nvSpPr>
+              <p:cNvPr id="5" name="Text Box 4"/>
+              <p:cNvSpPr txBox="1">
+                <a:spLocks noRot="1" noChangeAspect="1" noMove="1" noResize="1" noEditPoints="1" noAdjustHandles="1" noChangeArrowheads="1" noChangeShapeType="1" noTextEdit="1"/>
+              </p:cNvSpPr>
+              <p:nvPr/>
+            </p:nvSpPr>
+            <p:spPr>
+              <a:xfrm>
+                <a:off x="7291705" y="1131570"/>
+                <a:ext cx="3216275" cy="376555"/>
+              </a:xfrm>
+              <a:prstGeom prst="rect">
+                <a:avLst/>
+              </a:prstGeom>
+              <a:blipFill rotWithShape="1">
+                <a:blip r:embed="rId3"/>
+                <a:stretch>
+                  <a:fillRect/>
+                </a:stretch>
+              </a:blipFill>
+            </p:spPr>
+            <p:txBody>
+              <a:bodyPr/>
+              <a:lstStyle/>
+              <a:p>
+                <a:r>
+                  <a:rPr lang="en-US" altLang="en-US">
+                    <a:noFill/>
+                  </a:rPr>
+                  <a:t> </a:t>
+                </a:r>
+              </a:p>
+            </p:txBody>
+          </p:sp>
+        </mc:Fallback>
+      </mc:AlternateContent>
+      <mc:AlternateContent xmlns:mc="http://schemas.openxmlformats.org/markup-compatibility/2006">
+        <mc:Choice xmlns:a14="http://schemas.microsoft.com/office/drawing/2010/main" Requires="a14">
+          <p:sp>
+            <p:nvSpPr>
+              <p:cNvPr id="6" name="Text Box 5"/>
+              <p:cNvSpPr txBox="1"/>
+              <p:nvPr/>
+            </p:nvSpPr>
+            <p:spPr>
+              <a:xfrm>
+                <a:off x="6157595" y="885825"/>
+                <a:ext cx="1134110" cy="368300"/>
+              </a:xfrm>
+              <a:prstGeom prst="rect">
+                <a:avLst/>
+              </a:prstGeom>
+              <a:noFill/>
+            </p:spPr>
+            <p:txBody>
+              <a:bodyPr wrap="none" rtlCol="0" anchor="t">
+                <a:spAutoFit/>
+              </a:bodyPr>
+              <a:p>
+                <a14:m>
+                  <m:oMathPara xmlns:m="http://schemas.openxmlformats.org/officeDocument/2006/math">
+                    <m:oMathParaPr>
+                      <m:jc m:val="centerGroup"/>
+                    </m:oMathParaPr>
+                    <m:oMath xmlns:m="http://schemas.openxmlformats.org/officeDocument/2006/math">
+                      <m:r>
+                        <a:rPr lang="en-US" i="1">
+                          <a:solidFill>
+                            <a:schemeClr val="tx1"/>
+                          </a:solidFill>
+                          <a:latin typeface="DejaVu Math TeX Gyre" panose="02000503000000000000" charset="0"/>
+                          <a:cs typeface="DejaVu Math TeX Gyre" panose="02000503000000000000" charset="0"/>
+                        </a:rPr>
+                        <m:t>𝑜𝑢</m:t>
+                      </m:r>
+                    </m:oMath>
+                  </m:oMathPara>
+                </a14:m>
+                <a:endParaRPr lang="en-US" i="1">
+                  <a:solidFill>
+                    <a:schemeClr val="tx1"/>
+                  </a:solidFill>
+                  <a:latin typeface="DejaVu Math TeX Gyre" panose="02000503000000000000" charset="0"/>
+                  <a:cs typeface="DejaVu Math TeX Gyre" panose="02000503000000000000" charset="0"/>
+                </a:endParaRPr>
+              </a:p>
+            </p:txBody>
+          </p:sp>
+        </mc:Choice>
+        <mc:Fallback>
+          <p:sp>
+            <p:nvSpPr>
+              <p:cNvPr id="6" name="Text Box 5"/>
+              <p:cNvSpPr txBox="1">
+                <a:spLocks noRot="1" noChangeAspect="1" noMove="1" noResize="1" noEditPoints="1" noAdjustHandles="1" noChangeArrowheads="1" noChangeShapeType="1" noTextEdit="1"/>
+              </p:cNvSpPr>
+              <p:nvPr/>
+            </p:nvSpPr>
+            <p:spPr>
+              <a:xfrm>
+                <a:off x="6157595" y="885825"/>
+                <a:ext cx="1134110" cy="368300"/>
+              </a:xfrm>
+              <a:prstGeom prst="rect">
+                <a:avLst/>
+              </a:prstGeom>
+              <a:blipFill rotWithShape="1">
+                <a:blip r:embed="rId4"/>
+                <a:stretch>
+                  <a:fillRect/>
+                </a:stretch>
+              </a:blipFill>
+            </p:spPr>
+            <p:txBody>
+              <a:bodyPr/>
+              <a:lstStyle/>
+              <a:p>
+                <a:r>
+                  <a:rPr lang="en-US" altLang="en-US">
+                    <a:noFill/>
+                  </a:rPr>
+                  <a:t> </a:t>
+                </a:r>
+              </a:p>
+            </p:txBody>
+          </p:sp>
+        </mc:Fallback>
+      </mc:AlternateContent>
+      <p:sp>
+        <p:nvSpPr>
+          <p:cNvPr id="7" name="Text Box 6"/>
+          <p:cNvSpPr txBox="1"/>
+          <p:nvPr/>
+        </p:nvSpPr>
+        <p:spPr>
+          <a:xfrm>
+            <a:off x="1988185" y="5889625"/>
+            <a:ext cx="7550150" cy="337185"/>
+          </a:xfrm>
+          <a:prstGeom prst="rect">
+            <a:avLst/>
+          </a:prstGeom>
+          <a:noFill/>
+        </p:spPr>
+        <p:txBody>
+          <a:bodyPr wrap="none" rtlCol="0" anchor="t">
+            <a:spAutoFit/>
+          </a:bodyPr>
+          <a:p>
+            <a:r>
+              <a:rPr lang="pt-PT" altLang="en-US" sz="1600" i="1">
+                <a:solidFill>
+                  <a:schemeClr val="tx1"/>
+                </a:solidFill>
+                <a:latin typeface="DejaVu Math TeX Gyre" panose="02000503000000000000" charset="0"/>
+                <a:ea typeface="MS Mincho" charset="0"/>
+                <a:cs typeface="DejaVu Math TeX Gyre" panose="02000503000000000000" charset="0"/>
+              </a:rPr>
+              <a:t>p só diminui se for &lt;0.  Talvez valores teriam que variar entre 0.5 e 1.5</a:t>
+            </a:r>
+            <a:endParaRPr lang="pt-PT" altLang="en-US" sz="1600" i="1">
+              <a:solidFill>
+                <a:schemeClr val="tx1"/>
+              </a:solidFill>
+              <a:latin typeface="DejaVu Math TeX Gyre" panose="02000503000000000000" charset="0"/>
+              <a:ea typeface="MS Mincho" charset="0"/>
+              <a:cs typeface="DejaVu Math TeX Gyre" panose="02000503000000000000" charset="0"/>
+            </a:endParaRPr>
+          </a:p>
+        </p:txBody>
+      </p:sp>
+      <mc:AlternateContent xmlns:mc="http://schemas.openxmlformats.org/markup-compatibility/2006">
+        <mc:Choice xmlns:a14="http://schemas.microsoft.com/office/drawing/2010/main" Requires="a14">
+          <p:sp>
+            <p:nvSpPr>
+              <p:cNvPr id="2" name="Text Box 1"/>
+              <p:cNvSpPr txBox="1"/>
+              <p:nvPr/>
+            </p:nvSpPr>
+            <p:spPr>
+              <a:xfrm>
+                <a:off x="1065530" y="1350645"/>
+                <a:ext cx="3828415" cy="376555"/>
+              </a:xfrm>
+              <a:prstGeom prst="rect">
+                <a:avLst/>
+              </a:prstGeom>
+              <a:noFill/>
+            </p:spPr>
+            <p:txBody>
+              <a:bodyPr wrap="none" rtlCol="0" anchor="t">
+                <a:spAutoFit/>
+              </a:bodyPr>
+              <a:p>
+                <a14:m>
+                  <m:oMathPara xmlns:m="http://schemas.openxmlformats.org/officeDocument/2006/math">
+                    <m:oMathParaPr>
+                      <m:jc m:val="centerGroup"/>
+                    </m:oMathParaPr>
+                    <m:oMath xmlns:m="http://schemas.openxmlformats.org/officeDocument/2006/math">
+                      <m:sSup>
+                        <m:sSupPr>
+                          <m:ctrlPr>
+                            <a:rPr lang="en-US" i="1">
+                              <a:solidFill>
+                                <a:schemeClr val="tx1"/>
+                              </a:solidFill>
+                              <a:latin typeface="DejaVu Math TeX Gyre" panose="02000503000000000000" charset="0"/>
+                              <a:cs typeface="DejaVu Math TeX Gyre" panose="02000503000000000000" charset="0"/>
+                            </a:rPr>
+                          </m:ctrlPr>
+                        </m:sSupPr>
+                        <m:e>
+                          <m:r>
+                            <a:rPr lang="en-US" i="1">
+                              <a:solidFill>
+                                <a:schemeClr val="tx1"/>
+                              </a:solidFill>
+                              <a:latin typeface="DejaVu Math TeX Gyre" panose="02000503000000000000" charset="0"/>
+                              <a:cs typeface="DejaVu Math TeX Gyre" panose="02000503000000000000" charset="0"/>
+                            </a:rPr>
+                            <m:t>𝜌</m:t>
+                          </m:r>
+                        </m:e>
+                        <m:sup>
+                          <m:r>
+                            <a:rPr lang="en-US" i="1">
+                              <a:solidFill>
+                                <a:schemeClr val="tx1"/>
+                              </a:solidFill>
+                              <a:latin typeface="DejaVu Math TeX Gyre" panose="02000503000000000000" charset="0"/>
+                              <a:cs typeface="DejaVu Math TeX Gyre" panose="02000503000000000000" charset="0"/>
+                            </a:rPr>
+                            <m:t>’</m:t>
+                          </m:r>
+                        </m:sup>
+                      </m:sSup>
+                      <m:r>
+                        <a:rPr lang="en-US" i="1">
+                          <a:solidFill>
+                            <a:schemeClr val="tx1"/>
+                          </a:solidFill>
+                          <a:latin typeface="DejaVu Math TeX Gyre" panose="02000503000000000000" charset="0"/>
+                          <a:cs typeface="DejaVu Math TeX Gyre" panose="02000503000000000000" charset="0"/>
+                        </a:rPr>
+                        <m:t>=</m:t>
+                      </m:r>
+                      <m:r>
+                        <a:rPr lang="en-US" i="1">
+                          <a:solidFill>
+                            <a:schemeClr val="tx1"/>
+                          </a:solidFill>
+                          <a:latin typeface="DejaVu Math TeX Gyre" panose="02000503000000000000" charset="0"/>
+                          <a:cs typeface="DejaVu Math TeX Gyre" panose="02000503000000000000" charset="0"/>
+                        </a:rPr>
+                        <m:t>𝐿𝑜𝑔𝑁𝑜𝑟𝑚𝑎𝑙</m:t>
+                      </m:r>
+                      <m:r>
+                        <a:rPr lang="en-US" i="1">
+                          <a:solidFill>
+                            <a:schemeClr val="tx1"/>
+                          </a:solidFill>
+                          <a:latin typeface="DejaVu Math TeX Gyre" panose="02000503000000000000" charset="0"/>
+                          <a:cs typeface="DejaVu Math TeX Gyre" panose="02000503000000000000" charset="0"/>
+                        </a:rPr>
+                        <m:t>(</m:t>
+                      </m:r>
+                      <m:r>
+                        <a:rPr lang="en-US" i="1">
+                          <a:solidFill>
+                            <a:schemeClr val="tx1"/>
+                          </a:solidFill>
+                          <a:latin typeface="DejaVu Math TeX Gyre" panose="02000503000000000000" charset="0"/>
+                          <a:cs typeface="DejaVu Math TeX Gyre" panose="02000503000000000000" charset="0"/>
+                        </a:rPr>
+                        <m:t>1</m:t>
+                      </m:r>
+                      <m:r>
+                        <a:rPr lang="en-US" i="1">
+                          <a:solidFill>
+                            <a:schemeClr val="tx1"/>
+                          </a:solidFill>
+                          <a:latin typeface="DejaVu Math TeX Gyre" panose="02000503000000000000" charset="0"/>
+                          <a:cs typeface="DejaVu Math TeX Gyre" panose="02000503000000000000" charset="0"/>
+                        </a:rPr>
+                        <m:t>,</m:t>
+                      </m:r>
+                      <m:r>
+                        <a:rPr lang="en-US" i="1">
+                          <a:solidFill>
+                            <a:schemeClr val="tx1"/>
+                          </a:solidFill>
+                          <a:latin typeface="DejaVu Math TeX Gyre" panose="02000503000000000000" charset="0"/>
+                          <a:cs typeface="DejaVu Math TeX Gyre" panose="02000503000000000000" charset="0"/>
+                        </a:rPr>
+                        <m:t>0</m:t>
+                      </m:r>
+                      <m:r>
+                        <a:rPr lang="en-US" i="1">
+                          <a:solidFill>
+                            <a:schemeClr val="tx1"/>
+                          </a:solidFill>
+                          <a:latin typeface="DejaVu Math TeX Gyre" panose="02000503000000000000" charset="0"/>
+                          <a:cs typeface="DejaVu Math TeX Gyre" panose="02000503000000000000" charset="0"/>
+                        </a:rPr>
+                        <m:t>.</m:t>
+                      </m:r>
+                      <m:r>
+                        <a:rPr lang="en-US" i="1">
+                          <a:solidFill>
+                            <a:schemeClr val="tx1"/>
+                          </a:solidFill>
+                          <a:latin typeface="DejaVu Math TeX Gyre" panose="02000503000000000000" charset="0"/>
+                          <a:cs typeface="DejaVu Math TeX Gyre" panose="02000503000000000000" charset="0"/>
+                        </a:rPr>
+                        <m:t>67</m:t>
+                      </m:r>
+                      <m:r>
+                        <a:rPr lang="en-US" i="1">
+                          <a:solidFill>
+                            <a:schemeClr val="tx1"/>
+                          </a:solidFill>
+                          <a:latin typeface="DejaVu Math TeX Gyre" panose="02000503000000000000" charset="0"/>
+                          <a:ea typeface="MS Mincho" charset="0"/>
+                          <a:cs typeface="DejaVu Math TeX Gyre" panose="02000503000000000000" charset="0"/>
+                        </a:rPr>
+                        <m:t>) / </m:t>
+                      </m:r>
+                      <m:r>
+                        <a:rPr lang="en-US" i="1">
+                          <a:solidFill>
+                            <a:schemeClr val="tx1"/>
+                          </a:solidFill>
+                          <a:latin typeface="DejaVu Math TeX Gyre" panose="02000503000000000000" charset="0"/>
+                          <a:ea typeface="MS Mincho" charset="0"/>
+                          <a:cs typeface="DejaVu Math TeX Gyre" panose="02000503000000000000" charset="0"/>
+                        </a:rPr>
+                        <m:t>100</m:t>
+                      </m:r>
+                    </m:oMath>
+                  </m:oMathPara>
+                </a14:m>
+                <a:endParaRPr lang="en-US" i="1">
+                  <a:solidFill>
+                    <a:schemeClr val="tx1"/>
+                  </a:solidFill>
+                  <a:latin typeface="DejaVu Math TeX Gyre" panose="02000503000000000000" charset="0"/>
+                  <a:ea typeface="MS Mincho" charset="0"/>
+                  <a:cs typeface="DejaVu Math TeX Gyre" panose="02000503000000000000" charset="0"/>
+                </a:endParaRPr>
+              </a:p>
+            </p:txBody>
+          </p:sp>
+        </mc:Choice>
+        <mc:Fallback>
+          <p:sp>
+            <p:nvSpPr>
+              <p:cNvPr id="2" name="Text Box 1"/>
+              <p:cNvSpPr txBox="1">
+                <a:spLocks noRot="1" noChangeAspect="1" noMove="1" noResize="1" noEditPoints="1" noAdjustHandles="1" noChangeArrowheads="1" noChangeShapeType="1" noTextEdit="1"/>
+              </p:cNvSpPr>
+              <p:nvPr/>
+            </p:nvSpPr>
+            <p:spPr>
+              <a:xfrm>
+                <a:off x="1065530" y="1350645"/>
+                <a:ext cx="3828415" cy="376555"/>
+              </a:xfrm>
+              <a:prstGeom prst="rect">
+                <a:avLst/>
+              </a:prstGeom>
+              <a:blipFill rotWithShape="1">
+                <a:blip r:embed="rId5"/>
+                <a:stretch>
+                  <a:fillRect/>
+                </a:stretch>
+              </a:blipFill>
+            </p:spPr>
+            <p:txBody>
+              <a:bodyPr/>
+              <a:lstStyle/>
+              <a:p>
+                <a:r>
+                  <a:rPr lang="en-US" altLang="en-US">
+                    <a:noFill/>
+                  </a:rPr>
+                  <a:t> </a:t>
+                </a:r>
+              </a:p>
+            </p:txBody>
+          </p:sp>
+        </mc:Fallback>
+      </mc:AlternateContent>
+    </p:spTree>
+  </p:cSld>
+  <p:clrMapOvr>
+    <a:masterClrMapping/>
+  </p:clrMapOvr>
+</p:sld>
+</file>
+
+<file path=ppt/slides/slide5.xml><?xml version="1.0" encoding="utf-8"?>
+<p:sld xmlns:a="http://schemas.openxmlformats.org/drawingml/2006/main" xmlns:r="http://schemas.openxmlformats.org/officeDocument/2006/relationships" xmlns:p="http://schemas.openxmlformats.org/presentationml/2006/main">
+  <p:cSld>
+    <p:spTree>
+      <p:nvGrpSpPr>
+        <p:cNvPr id="1" name=""/>
+        <p:cNvGrpSpPr/>
+        <p:nvPr/>
+      </p:nvGrpSpPr>
+      <p:grpSpPr/>
+      <mc:AlternateContent xmlns:mc="http://schemas.openxmlformats.org/markup-compatibility/2006">
+        <mc:Choice xmlns:a14="http://schemas.microsoft.com/office/drawing/2010/main" Requires="a14">
+          <p:sp>
+            <p:nvSpPr>
+              <p:cNvPr id="27" name="Text Box 26"/>
+              <p:cNvSpPr txBox="1"/>
+              <p:nvPr/>
+            </p:nvSpPr>
+            <p:spPr>
+              <a:xfrm>
+                <a:off x="2606675" y="705485"/>
+                <a:ext cx="6978650" cy="5447665"/>
+              </a:xfrm>
+              <a:prstGeom prst="rect">
+                <a:avLst/>
+              </a:prstGeom>
+              <a:noFill/>
+            </p:spPr>
+            <p:txBody>
+              <a:bodyPr wrap="square" rtlCol="0">
+                <a:spAutoFit/>
+              </a:bodyPr>
+              <a:p>
+                <a:pPr lvl="0" indent="0" algn="just">
+                  <a:lnSpc>
+                    <a:spcPct val="150000"/>
+                  </a:lnSpc>
+                  <a:buFont typeface="Arial" panose="020B0604020202020204" pitchFamily="34" charset="0"/>
+                  <a:buNone/>
+                </a:pPr>
+                <a:r>
+                  <a:rPr lang="pt-PT" altLang="en-US" sz="1600" b="1">
+                    <a:sym typeface="+mn-ea"/>
+                  </a:rPr>
+                  <a:t>ALTERNATIVA 2 com mais perturbações:</a:t>
+                </a:r>
+                <a:endParaRPr lang="pt-PT" altLang="en-US" sz="1600" b="1">
+                  <a:sym typeface="+mn-ea"/>
+                </a:endParaRPr>
+              </a:p>
+              <a:p>
+                <a:pPr marL="285750" lvl="0" indent="-285750" algn="just">
+                  <a:lnSpc>
+                    <a:spcPct val="150000"/>
+                  </a:lnSpc>
+                  <a:buFont typeface="Arial" panose="020B0604020202020204" pitchFamily="34" charset="0"/>
+                  <a:buChar char="•"/>
+                </a:pPr>
+                <a:r>
+                  <a:rPr lang="pt-PT" altLang="en-US" sz="1600"/>
+                  <a:t>FOR cada variável:</a:t>
+                </a:r>
+                <a:endParaRPr lang="pt-PT" altLang="en-US" sz="1600"/>
+              </a:p>
+              <a:p>
+                <a:pPr marL="742950" lvl="1" indent="-285750" algn="just">
+                  <a:lnSpc>
+                    <a:spcPct val="150000"/>
+                  </a:lnSpc>
+                  <a:buFont typeface="Arial" panose="020B0604020202020204" pitchFamily="34" charset="0"/>
+                  <a:buChar char="•"/>
+                </a:pPr>
+                <a:r>
+                  <a:rPr lang="pt-PT" altLang="en-US" sz="1600">
+                    <a:sym typeface="+mn-ea"/>
+                  </a:rPr>
+                  <a:t>Perturba com </a:t>
+                </a:r>
+                <a14:m>
+                  <m:oMath xmlns:m="http://schemas.openxmlformats.org/officeDocument/2006/math">
+                    <m:sSubSup>
+                      <m:sSubSupPr>
+                        <m:ctrlPr>
+                          <a:rPr lang="en-US" sz="1600" i="1">
+                            <a:latin typeface="DejaVu Math TeX Gyre" panose="02000503000000000000" charset="0"/>
+                            <a:cs typeface="DejaVu Math TeX Gyre" panose="02000503000000000000" charset="0"/>
+                          </a:rPr>
+                        </m:ctrlPr>
+                      </m:sSubSupPr>
+                      <m:e>
+                        <m:r>
+                          <a:rPr lang="en-US" sz="1600" i="1">
+                            <a:latin typeface="DejaVu Math TeX Gyre" panose="02000503000000000000" charset="0"/>
+                            <a:cs typeface="DejaVu Math TeX Gyre" panose="02000503000000000000" charset="0"/>
+                          </a:rPr>
+                          <m:t>𝑥</m:t>
+                        </m:r>
+                      </m:e>
+                      <m:sub>
+                        <m:r>
+                          <a:rPr lang="en-US" sz="1600" i="1">
+                            <a:latin typeface="DejaVu Math TeX Gyre" panose="02000503000000000000" charset="0"/>
+                            <a:cs typeface="DejaVu Math TeX Gyre" panose="02000503000000000000" charset="0"/>
+                          </a:rPr>
+                          <m:t>𝑖</m:t>
+                        </m:r>
+                      </m:sub>
+                      <m:sup>
+                        <m:r>
+                          <a:rPr lang="en-US" sz="1600" i="1">
+                            <a:latin typeface="DejaVu Math TeX Gyre" panose="02000503000000000000" charset="0"/>
+                            <a:cs typeface="DejaVu Math TeX Gyre" panose="02000503000000000000" charset="0"/>
+                          </a:rPr>
+                          <m:t>’</m:t>
+                        </m:r>
+                      </m:sup>
+                    </m:sSubSup>
+                    <m:r>
+                      <a:rPr lang="en-US" sz="1600" i="1">
+                        <a:latin typeface="DejaVu Math TeX Gyre" panose="02000503000000000000" charset="0"/>
+                        <a:cs typeface="DejaVu Math TeX Gyre" panose="02000503000000000000" charset="0"/>
+                      </a:rPr>
+                      <m:t>=</m:t>
+                    </m:r>
+                    <m:sSub>
+                      <m:sSubPr>
+                        <m:ctrlPr>
+                          <a:rPr lang="en-US" sz="1600" i="1">
+                            <a:latin typeface="DejaVu Math TeX Gyre" panose="02000503000000000000" charset="0"/>
+                            <a:cs typeface="DejaVu Math TeX Gyre" panose="02000503000000000000" charset="0"/>
+                          </a:rPr>
+                        </m:ctrlPr>
+                      </m:sSubPr>
+                      <m:e>
+                        <m:r>
+                          <a:rPr lang="en-US" sz="1600" i="1">
+                            <a:latin typeface="DejaVu Math TeX Gyre" panose="02000503000000000000" charset="0"/>
+                            <a:cs typeface="DejaVu Math TeX Gyre" panose="02000503000000000000" charset="0"/>
+                          </a:rPr>
+                          <m:t>𝑥</m:t>
+                        </m:r>
+                      </m:e>
+                      <m:sub>
+                        <m:r>
+                          <a:rPr lang="en-US" sz="1600" i="1">
+                            <a:latin typeface="DejaVu Math TeX Gyre" panose="02000503000000000000" charset="0"/>
+                            <a:cs typeface="DejaVu Math TeX Gyre" panose="02000503000000000000" charset="0"/>
+                          </a:rPr>
+                          <m:t>𝑖</m:t>
+                        </m:r>
+                      </m:sub>
+                    </m:sSub>
+                    <m:r>
+                      <a:rPr lang="en-US" sz="1600" i="1">
+                        <a:latin typeface="DejaVu Math TeX Gyre" panose="02000503000000000000" charset="0"/>
+                        <a:cs typeface="DejaVu Math TeX Gyre" panose="02000503000000000000" charset="0"/>
+                      </a:rPr>
+                      <m:t>+</m:t>
+                    </m:r>
+                    <m:r>
+                      <a:rPr lang="en-US" sz="1600" i="1">
+                        <a:latin typeface="DejaVu Math TeX Gyre" panose="02000503000000000000" charset="0"/>
+                        <a:cs typeface="DejaVu Math TeX Gyre" panose="02000503000000000000" charset="0"/>
+                      </a:rPr>
+                      <m:t>𝑁</m:t>
+                    </m:r>
+                    <m:r>
+                      <a:rPr lang="en-US" sz="1600" i="1">
+                        <a:latin typeface="DejaVu Math TeX Gyre" panose="02000503000000000000" charset="0"/>
+                        <a:cs typeface="DejaVu Math TeX Gyre" panose="02000503000000000000" charset="0"/>
+                      </a:rPr>
+                      <m:t>(</m:t>
+                    </m:r>
+                    <m:r>
+                      <a:rPr lang="en-US" sz="1600" i="1">
+                        <a:latin typeface="DejaVu Math TeX Gyre" panose="02000503000000000000" charset="0"/>
+                        <a:cs typeface="DejaVu Math TeX Gyre" panose="02000503000000000000" charset="0"/>
+                      </a:rPr>
+                      <m:t>0</m:t>
+                    </m:r>
+                    <m:r>
+                      <a:rPr lang="en-US" sz="1600" i="1">
+                        <a:latin typeface="DejaVu Math TeX Gyre" panose="02000503000000000000" charset="0"/>
+                        <a:cs typeface="DejaVu Math TeX Gyre" panose="02000503000000000000" charset="0"/>
+                      </a:rPr>
+                      <m:t>,</m:t>
+                    </m:r>
+                    <m:r>
+                      <a:rPr lang="en-US" sz="1600" i="1">
+                        <a:latin typeface="DejaVu Math TeX Gyre" panose="02000503000000000000" charset="0"/>
+                        <a:cs typeface="DejaVu Math TeX Gyre" panose="02000503000000000000" charset="0"/>
+                      </a:rPr>
+                      <m:t>𝜎</m:t>
+                    </m:r>
+                    <m:r>
+                      <a:rPr lang="en-US" sz="1600" i="1">
+                        <a:latin typeface="DejaVu Math TeX Gyre" panose="02000503000000000000" charset="0"/>
+                        <a:cs typeface="DejaVu Math TeX Gyre" panose="02000503000000000000" charset="0"/>
+                      </a:rPr>
+                      <m:t>)</m:t>
+                    </m:r>
+                  </m:oMath>
+                </a14:m>
+                <a:r>
+                  <a:rPr lang="pt-PT" altLang="en-US" sz="1600">
+                    <a:sym typeface="+mn-ea"/>
+                  </a:rPr>
+                  <a:t> </a:t>
+                </a:r>
+                <a:endParaRPr lang="pt-PT" altLang="en-US" sz="1600">
+                  <a:sym typeface="+mn-ea"/>
+                </a:endParaRPr>
+              </a:p>
+              <a:p>
+                <a:pPr marL="742950" lvl="1" indent="-285750" algn="just">
+                  <a:lnSpc>
+                    <a:spcPct val="150000"/>
+                  </a:lnSpc>
+                  <a:buFont typeface="Arial" panose="020B0604020202020204" pitchFamily="34" charset="0"/>
+                  <a:buChar char="•"/>
+                </a:pPr>
+                <a:r>
+                  <a:rPr lang="pt-PT" altLang="en-US" sz="1600">
+                    <a:sym typeface="+mn-ea"/>
+                  </a:rPr>
+                  <a:t>Calcula o valor de f(x) só com essa variável perturbada. Esse será o valor da adaptabilidade dessa variável.</a:t>
+                </a:r>
+                <a:endParaRPr lang="pt-PT" altLang="en-US" sz="1600">
+                  <a:sym typeface="+mn-ea"/>
+                </a:endParaRPr>
+              </a:p>
+              <a:p>
+                <a:pPr marL="285750" lvl="0" indent="-285750" algn="just">
+                  <a:lnSpc>
+                    <a:spcPct val="150000"/>
+                  </a:lnSpc>
+                  <a:buFont typeface="Arial" panose="020B0604020202020204" pitchFamily="34" charset="0"/>
+                  <a:buChar char="•"/>
+                </a:pPr>
+                <a:r>
+                  <a:rPr lang="pt-PT" altLang="en-US" sz="1600">
+                    <a:sym typeface="+mn-ea"/>
+                  </a:rPr>
+                  <a:t>ENDFOR</a:t>
+                </a:r>
+                <a:endParaRPr lang="pt-PT" altLang="en-US" sz="1600">
+                  <a:sym typeface="+mn-ea"/>
+                </a:endParaRPr>
+              </a:p>
+              <a:p>
+                <a:pPr marL="285750" lvl="0" indent="-285750" algn="just">
+                  <a:lnSpc>
+                    <a:spcPct val="150000"/>
+                  </a:lnSpc>
+                  <a:buFont typeface="Arial" panose="020B0604020202020204" pitchFamily="34" charset="0"/>
+                  <a:buChar char="•"/>
+                </a:pPr>
+                <a:r>
+                  <a:rPr lang="pt-PT" altLang="en-US" sz="1600">
+                    <a:solidFill>
+                      <a:schemeClr val="accent5"/>
+                    </a:solidFill>
+                    <a:sym typeface="+mn-ea"/>
+                  </a:rPr>
+                  <a:t>Perturba o sigma com </a:t>
+                </a:r>
+                <a14:m>
+                  <m:oMath xmlns:m="http://schemas.openxmlformats.org/officeDocument/2006/math">
+                    <m:sSup>
+                      <m:sSupPr>
+                        <m:ctrlPr>
+                          <a:rPr lang="en-US" sz="1600" i="1">
+                            <a:solidFill>
+                              <a:schemeClr val="accent5"/>
+                            </a:solidFill>
+                            <a:latin typeface="DejaVu Math TeX Gyre" panose="02000503000000000000" charset="0"/>
+                            <a:cs typeface="DejaVu Math TeX Gyre" panose="02000503000000000000" charset="0"/>
+                          </a:rPr>
+                        </m:ctrlPr>
+                      </m:sSupPr>
+                      <m:e>
+                        <m:r>
+                          <a:rPr lang="en-US" sz="1600" i="1">
+                            <a:solidFill>
+                              <a:schemeClr val="accent5"/>
+                            </a:solidFill>
+                            <a:latin typeface="DejaVu Math TeX Gyre" panose="02000503000000000000" charset="0"/>
+                            <a:cs typeface="DejaVu Math TeX Gyre" panose="02000503000000000000" charset="0"/>
+                          </a:rPr>
+                          <m:t>𝜎</m:t>
+                        </m:r>
+                      </m:e>
+                      <m:sup>
+                        <m:r>
+                          <a:rPr lang="en-US" sz="1600" i="1">
+                            <a:solidFill>
+                              <a:schemeClr val="accent5"/>
+                            </a:solidFill>
+                            <a:latin typeface="DejaVu Math TeX Gyre" panose="02000503000000000000" charset="0"/>
+                            <a:cs typeface="DejaVu Math TeX Gyre" panose="02000503000000000000" charset="0"/>
+                          </a:rPr>
+                          <m:t>’</m:t>
+                        </m:r>
+                      </m:sup>
+                    </m:sSup>
+                    <m:r>
+                      <a:rPr lang="en-US" sz="1600" i="1">
+                        <a:solidFill>
+                          <a:schemeClr val="accent5"/>
+                        </a:solidFill>
+                        <a:latin typeface="DejaVu Math TeX Gyre" panose="02000503000000000000" charset="0"/>
+                        <a:cs typeface="DejaVu Math TeX Gyre" panose="02000503000000000000" charset="0"/>
+                      </a:rPr>
+                      <m:t>=</m:t>
+                    </m:r>
+                    <m:r>
+                      <a:rPr lang="en-US" sz="1600" i="1">
+                        <a:solidFill>
+                          <a:schemeClr val="accent5"/>
+                        </a:solidFill>
+                        <a:latin typeface="DejaVu Math TeX Gyre" panose="02000503000000000000" charset="0"/>
+                        <a:cs typeface="DejaVu Math TeX Gyre" panose="02000503000000000000" charset="0"/>
+                      </a:rPr>
+                      <m:t>𝜎</m:t>
+                    </m:r>
+                    <m:r>
+                      <a:rPr lang="en-US" sz="1600" i="1">
+                        <a:solidFill>
+                          <a:schemeClr val="accent5"/>
+                        </a:solidFill>
+                        <a:latin typeface="DejaVu Math TeX Gyre" panose="02000503000000000000" charset="0"/>
+                        <a:cs typeface="DejaVu Math TeX Gyre" panose="02000503000000000000" charset="0"/>
+                      </a:rPr>
+                      <m:t>∙</m:t>
+                    </m:r>
+                    <m:r>
+                      <a:rPr lang="en-US" sz="1600" i="1">
+                        <a:solidFill>
+                          <a:schemeClr val="accent5"/>
+                        </a:solidFill>
+                        <a:latin typeface="DejaVu Math TeX Gyre" panose="02000503000000000000" charset="0"/>
+                        <a:cs typeface="DejaVu Math TeX Gyre" panose="02000503000000000000" charset="0"/>
+                      </a:rPr>
+                      <m:t>𝐿𝑜𝑔𝑁𝑜𝑟𝑚𝑎𝑙</m:t>
+                    </m:r>
+                    <m:r>
+                      <a:rPr lang="en-US" sz="1600" i="1">
+                        <a:solidFill>
+                          <a:schemeClr val="accent5"/>
+                        </a:solidFill>
+                        <a:latin typeface="DejaVu Math TeX Gyre" panose="02000503000000000000" charset="0"/>
+                        <a:cs typeface="DejaVu Math TeX Gyre" panose="02000503000000000000" charset="0"/>
+                      </a:rPr>
+                      <m:t>(</m:t>
+                    </m:r>
+                    <m:r>
+                      <a:rPr lang="en-US" sz="1600" i="1">
+                        <a:solidFill>
+                          <a:schemeClr val="accent5"/>
+                        </a:solidFill>
+                        <a:latin typeface="DejaVu Math TeX Gyre" panose="02000503000000000000" charset="0"/>
+                        <a:cs typeface="DejaVu Math TeX Gyre" panose="02000503000000000000" charset="0"/>
+                      </a:rPr>
+                      <m:t>0</m:t>
+                    </m:r>
+                    <m:r>
+                      <a:rPr lang="en-US" sz="1600" i="1">
+                        <a:solidFill>
+                          <a:schemeClr val="accent5"/>
+                        </a:solidFill>
+                        <a:latin typeface="DejaVu Math TeX Gyre" panose="02000503000000000000" charset="0"/>
+                        <a:cs typeface="DejaVu Math TeX Gyre" panose="02000503000000000000" charset="0"/>
+                      </a:rPr>
+                      <m:t>,</m:t>
+                    </m:r>
+                    <m:r>
+                      <a:rPr lang="en-US" sz="1600" i="1">
+                        <a:solidFill>
+                          <a:schemeClr val="accent5"/>
+                        </a:solidFill>
+                        <a:latin typeface="DejaVu Math TeX Gyre" panose="02000503000000000000" charset="0"/>
+                        <a:cs typeface="DejaVu Math TeX Gyre" panose="02000503000000000000" charset="0"/>
+                      </a:rPr>
+                      <m:t>𝛼</m:t>
+                    </m:r>
+                    <m:r>
+                      <a:rPr lang="en-US" sz="1600" i="1">
+                        <a:solidFill>
+                          <a:schemeClr val="accent5"/>
+                        </a:solidFill>
+                        <a:latin typeface="DejaVu Math TeX Gyre" panose="02000503000000000000" charset="0"/>
+                        <a:ea typeface="MS Mincho" charset="0"/>
+                        <a:cs typeface="DejaVu Math TeX Gyre" panose="02000503000000000000" charset="0"/>
+                      </a:rPr>
+                      <m:t>)</m:t>
+                    </m:r>
+                  </m:oMath>
+                </a14:m>
+                <a:r>
+                  <a:rPr lang="pt-PT" altLang="en-US" sz="1600">
+                    <a:solidFill>
+                      <a:schemeClr val="accent5"/>
+                    </a:solidFill>
+                    <a:latin typeface="DejaVu Math TeX Gyre" panose="02000503000000000000" charset="0"/>
+                    <a:ea typeface="MS Mincho" charset="0"/>
+                    <a:cs typeface="DejaVu Math TeX Gyre" panose="02000503000000000000" charset="0"/>
+                  </a:rPr>
+                  <a:t>, </a:t>
+                </a:r>
+                <a:r>
+                  <a:rPr lang="pt-PT" altLang="en-US" sz="1600">
+                    <a:solidFill>
+                      <a:schemeClr val="accent5"/>
+                    </a:solidFill>
+                    <a:sym typeface="+mn-ea"/>
+                  </a:rPr>
+                  <a:t>onde </a:t>
+                </a:r>
+                <a14:m>
+                  <m:oMath xmlns:m="http://schemas.openxmlformats.org/officeDocument/2006/math">
+                    <m:r>
+                      <a:rPr lang="en-US" altLang="pt-PT" sz="1600" i="1">
+                        <a:solidFill>
+                          <a:schemeClr val="accent5"/>
+                        </a:solidFill>
+                        <a:latin typeface="DejaVu Math TeX Gyre" panose="02000503000000000000" charset="0"/>
+                        <a:cs typeface="DejaVu Math TeX Gyre" panose="02000503000000000000" charset="0"/>
+                        <a:sym typeface="+mn-ea"/>
+                      </a:rPr>
+                      <m:t>𝛼</m:t>
+                    </m:r>
+                    <m:r>
+                      <a:rPr lang="en-US" altLang="pt-PT" sz="1600" i="1">
+                        <a:solidFill>
+                          <a:schemeClr val="accent5"/>
+                        </a:solidFill>
+                        <a:latin typeface="DejaVu Math TeX Gyre" panose="02000503000000000000" charset="0"/>
+                        <a:cs typeface="DejaVu Math TeX Gyre" panose="02000503000000000000" charset="0"/>
+                        <a:sym typeface="+mn-ea"/>
+                      </a:rPr>
+                      <m:t>=</m:t>
+                    </m:r>
+                    <m:f>
+                      <m:fPr>
+                        <m:type m:val="lin"/>
+                        <m:ctrlPr>
+                          <a:rPr lang="en-US" altLang="pt-PT" sz="1600" i="1">
+                            <a:solidFill>
+                              <a:schemeClr val="accent5"/>
+                            </a:solidFill>
+                            <a:latin typeface="DejaVu Math TeX Gyre" panose="02000503000000000000" charset="0"/>
+                            <a:cs typeface="DejaVu Math TeX Gyre" panose="02000503000000000000" charset="0"/>
+                            <a:sym typeface="+mn-ea"/>
+                          </a:rPr>
+                        </m:ctrlPr>
+                      </m:fPr>
+                      <m:num>
+                        <m:r>
+                          <a:rPr lang="en-US" altLang="pt-PT" sz="1600" i="1">
+                            <a:solidFill>
+                              <a:schemeClr val="accent5"/>
+                            </a:solidFill>
+                            <a:latin typeface="DejaVu Math TeX Gyre" panose="02000503000000000000" charset="0"/>
+                            <a:cs typeface="DejaVu Math TeX Gyre" panose="02000503000000000000" charset="0"/>
+                            <a:sym typeface="+mn-ea"/>
+                          </a:rPr>
+                          <m:t>1</m:t>
+                        </m:r>
+                      </m:num>
+                      <m:den>
+                        <m:rad>
+                          <m:radPr>
+                            <m:ctrlPr>
+                              <a:rPr lang="en-US" altLang="pt-PT" sz="1600" i="1">
+                                <a:solidFill>
+                                  <a:schemeClr val="accent5"/>
+                                </a:solidFill>
+                                <a:latin typeface="DejaVu Math TeX Gyre" panose="02000503000000000000" charset="0"/>
+                                <a:cs typeface="DejaVu Math TeX Gyre" panose="02000503000000000000" charset="0"/>
+                                <a:sym typeface="+mn-ea"/>
+                              </a:rPr>
+                            </m:ctrlPr>
+                          </m:radPr>
+                          <m:deg>
+                            <m:r>
+                              <a:rPr lang="en-US" altLang="pt-PT" sz="1600" i="1">
+                                <a:solidFill>
+                                  <a:schemeClr val="accent5"/>
+                                </a:solidFill>
+                                <a:latin typeface="DejaVu Math TeX Gyre" panose="02000503000000000000" charset="0"/>
+                                <a:cs typeface="DejaVu Math TeX Gyre" panose="02000503000000000000" charset="0"/>
+                                <a:sym typeface="+mn-ea"/>
+                              </a:rPr>
+                              <m:t>2</m:t>
+                            </m:r>
+                          </m:deg>
+                          <m:e>
+                            <m:r>
+                              <a:rPr lang="en-US" altLang="pt-PT" sz="1600" i="1">
+                                <a:solidFill>
+                                  <a:schemeClr val="accent5"/>
+                                </a:solidFill>
+                                <a:latin typeface="DejaVu Math TeX Gyre" panose="02000503000000000000" charset="0"/>
+                                <a:cs typeface="DejaVu Math TeX Gyre" panose="02000503000000000000" charset="0"/>
+                                <a:sym typeface="+mn-ea"/>
+                              </a:rPr>
+                              <m:t>𝑁</m:t>
+                            </m:r>
+                          </m:e>
+                        </m:rad>
+                      </m:den>
+                    </m:f>
+                  </m:oMath>
+                </a14:m>
+                <a:endParaRPr lang="en-US" sz="1600" i="1">
+                  <a:solidFill>
+                    <a:schemeClr val="accent5"/>
+                  </a:solidFill>
+                  <a:latin typeface="DejaVu Math TeX Gyre" panose="02000503000000000000" charset="0"/>
+                  <a:cs typeface="DejaVu Math TeX Gyre" panose="02000503000000000000" charset="0"/>
+                </a:endParaRPr>
+              </a:p>
+              <a:p>
+                <a:pPr marL="285750" lvl="0" indent="-285750" algn="just">
+                  <a:lnSpc>
+                    <a:spcPct val="150000"/>
+                  </a:lnSpc>
+                  <a:buFont typeface="Arial" panose="020B0604020202020204" pitchFamily="34" charset="0"/>
+                  <a:buChar char="•"/>
+                </a:pPr>
+                <a:r>
+                  <a:rPr lang="pt-PT" altLang="en-US" sz="1600">
+                    <a:solidFill>
+                      <a:schemeClr val="accent5"/>
+                    </a:solidFill>
+                    <a:sym typeface="+mn-ea"/>
+                  </a:rPr>
+                  <a:t> </a:t>
+                </a:r>
+                <a:r>
+                  <a:rPr lang="pt-PT" altLang="en-US" sz="1600">
+                    <a:solidFill>
+                      <a:srgbClr val="FF0000"/>
+                    </a:solidFill>
+                    <a:sym typeface="+mn-ea"/>
+                  </a:rPr>
+                  <a:t>Perturba cada variável por vez com o </a:t>
+                </a:r>
+                <a14:m>
+                  <m:oMath xmlns:m="http://schemas.openxmlformats.org/officeDocument/2006/math">
+                    <m:sSup>
+                      <m:sSupPr>
+                        <m:ctrlPr>
+                          <a:rPr lang="en-US" sz="1600" i="1">
+                            <a:solidFill>
+                              <a:srgbClr val="FF0000"/>
+                            </a:solidFill>
+                            <a:latin typeface="DejaVu Math TeX Gyre" panose="02000503000000000000" charset="0"/>
+                            <a:cs typeface="DejaVu Math TeX Gyre" panose="02000503000000000000" charset="0"/>
+                          </a:rPr>
+                        </m:ctrlPr>
+                      </m:sSupPr>
+                      <m:e>
+                        <m:r>
+                          <a:rPr lang="en-US" sz="1600" i="1">
+                            <a:solidFill>
+                              <a:srgbClr val="FF0000"/>
+                            </a:solidFill>
+                            <a:latin typeface="DejaVu Math TeX Gyre" panose="02000503000000000000" charset="0"/>
+                            <a:cs typeface="DejaVu Math TeX Gyre" panose="02000503000000000000" charset="0"/>
+                          </a:rPr>
+                          <m:t>𝜎</m:t>
+                        </m:r>
+                      </m:e>
+                      <m:sup>
+                        <m:r>
+                          <a:rPr lang="en-US" sz="1600" i="1">
+                            <a:solidFill>
+                              <a:srgbClr val="FF0000"/>
+                            </a:solidFill>
+                            <a:latin typeface="DejaVu Math TeX Gyre" panose="02000503000000000000" charset="0"/>
+                            <a:cs typeface="DejaVu Math TeX Gyre" panose="02000503000000000000" charset="0"/>
+                          </a:rPr>
+                          <m:t>’</m:t>
+                        </m:r>
+                      </m:sup>
+                    </m:sSup>
+                  </m:oMath>
+                </a14:m>
+                <a:r>
+                  <a:rPr lang="pt-PT" altLang="en-US" sz="1600">
+                    <a:solidFill>
+                      <a:srgbClr val="FF0000"/>
+                    </a:solidFill>
+                    <a:sym typeface="+mn-ea"/>
+                  </a:rPr>
+                  <a:t> e calcula a adaptabilidade delas de novo. Então cada variável terá 2 adaptabailidades, uma com </a:t>
+                </a:r>
+                <a14:m>
+                  <m:oMath xmlns:m="http://schemas.openxmlformats.org/officeDocument/2006/math">
+                    <m:r>
+                      <a:rPr lang="en-US" sz="1600" i="1">
+                        <a:solidFill>
+                          <a:srgbClr val="FF0000"/>
+                        </a:solidFill>
+                        <a:latin typeface="DejaVu Math TeX Gyre" panose="02000503000000000000" charset="0"/>
+                        <a:cs typeface="DejaVu Math TeX Gyre" panose="02000503000000000000" charset="0"/>
+                      </a:rPr>
+                      <m:t>𝜎</m:t>
+                    </m:r>
+                  </m:oMath>
+                </a14:m>
+                <a:r>
+                  <a:rPr lang="pt-PT" altLang="en-US" sz="1600">
+                    <a:solidFill>
+                      <a:srgbClr val="FF0000"/>
+                    </a:solidFill>
+                    <a:sym typeface="+mn-ea"/>
+                  </a:rPr>
+                  <a:t> e outra com </a:t>
+                </a:r>
+                <a14:m>
+                  <m:oMath xmlns:m="http://schemas.openxmlformats.org/officeDocument/2006/math">
+                    <m:sSup>
+                      <m:sSupPr>
+                        <m:ctrlPr>
+                          <a:rPr lang="en-US" sz="1600" i="1">
+                            <a:solidFill>
+                              <a:srgbClr val="FF0000"/>
+                            </a:solidFill>
+                            <a:latin typeface="DejaVu Math TeX Gyre" panose="02000503000000000000" charset="0"/>
+                            <a:cs typeface="DejaVu Math TeX Gyre" panose="02000503000000000000" charset="0"/>
+                          </a:rPr>
+                        </m:ctrlPr>
+                      </m:sSupPr>
+                      <m:e>
+                        <m:r>
+                          <a:rPr lang="en-US" sz="1600" i="1">
+                            <a:solidFill>
+                              <a:srgbClr val="FF0000"/>
+                            </a:solidFill>
+                            <a:latin typeface="DejaVu Math TeX Gyre" panose="02000503000000000000" charset="0"/>
+                            <a:cs typeface="DejaVu Math TeX Gyre" panose="02000503000000000000" charset="0"/>
+                          </a:rPr>
+                          <m:t>𝜎</m:t>
+                        </m:r>
+                      </m:e>
+                      <m:sup>
+                        <m:r>
+                          <a:rPr lang="en-US" sz="1600" i="1">
+                            <a:solidFill>
+                              <a:srgbClr val="FF0000"/>
+                            </a:solidFill>
+                            <a:latin typeface="DejaVu Math TeX Gyre" panose="02000503000000000000" charset="0"/>
+                            <a:cs typeface="DejaVu Math TeX Gyre" panose="02000503000000000000" charset="0"/>
+                          </a:rPr>
+                          <m:t>’</m:t>
+                        </m:r>
+                      </m:sup>
+                    </m:sSup>
+                  </m:oMath>
+                </a14:m>
+                <a:r>
+                  <a:rPr lang="pt-PT" altLang="en-US" sz="1600">
+                    <a:solidFill>
+                      <a:srgbClr val="FF0000"/>
+                    </a:solidFill>
+                    <a:sym typeface="+mn-ea"/>
+                  </a:rPr>
+                  <a:t>. </a:t>
+                </a:r>
+                <a:endParaRPr lang="pt-PT" altLang="en-US" sz="1600">
+                  <a:solidFill>
+                    <a:srgbClr val="FF0000"/>
+                  </a:solidFill>
+                  <a:sym typeface="+mn-ea"/>
+                </a:endParaRPr>
+              </a:p>
+              <a:p>
+                <a:pPr marL="285750" lvl="0" indent="-285750" algn="just">
+                  <a:lnSpc>
+                    <a:spcPct val="150000"/>
+                  </a:lnSpc>
+                  <a:buFont typeface="Arial" panose="020B0604020202020204" pitchFamily="34" charset="0"/>
+                  <a:buChar char="•"/>
+                </a:pPr>
+                <a:r>
+                  <a:rPr lang="pt-PT" altLang="en-US" sz="1600">
+                    <a:solidFill>
+                      <a:srgbClr val="FF0000"/>
+                    </a:solidFill>
+                    <a:sym typeface="+mn-ea"/>
+                  </a:rPr>
+                  <a:t>Foram geradas 2N+1 perturbações</a:t>
+                </a:r>
+                <a:endParaRPr lang="pt-PT" altLang="en-US" sz="1600">
+                  <a:solidFill>
+                    <a:srgbClr val="FF0000"/>
+                  </a:solidFill>
+                  <a:sym typeface="+mn-ea"/>
+                </a:endParaRPr>
+              </a:p>
+              <a:p>
+                <a:pPr marL="285750" lvl="0" indent="-285750" algn="just">
+                  <a:lnSpc>
+                    <a:spcPct val="150000"/>
+                  </a:lnSpc>
+                  <a:buFont typeface="Arial" panose="020B0604020202020204" pitchFamily="34" charset="0"/>
+                  <a:buChar char="•"/>
+                </a:pPr>
+                <a:r>
+                  <a:rPr lang="pt-PT" altLang="en-US" sz="1600">
+                    <a:solidFill>
+                      <a:srgbClr val="FF0000"/>
+                    </a:solidFill>
+                    <a:sym typeface="+mn-ea"/>
+                  </a:rPr>
+                  <a:t>Na hora de ordenar pelo f(x) e escolher uma perturbação, se a perturbação que utilizou o </a:t>
+                </a:r>
+                <a14:m>
+                  <m:oMath xmlns:m="http://schemas.openxmlformats.org/officeDocument/2006/math">
+                    <m:sSup>
+                      <m:sSupPr>
+                        <m:ctrlPr>
+                          <a:rPr lang="en-US" sz="1600" i="1">
+                            <a:solidFill>
+                              <a:srgbClr val="FF0000"/>
+                            </a:solidFill>
+                            <a:latin typeface="DejaVu Math TeX Gyre" panose="02000503000000000000" charset="0"/>
+                            <a:cs typeface="DejaVu Math TeX Gyre" panose="02000503000000000000" charset="0"/>
+                          </a:rPr>
+                        </m:ctrlPr>
+                      </m:sSupPr>
+                      <m:e>
+                        <m:r>
+                          <a:rPr lang="en-US" sz="1600" i="1">
+                            <a:solidFill>
+                              <a:srgbClr val="FF0000"/>
+                            </a:solidFill>
+                            <a:latin typeface="DejaVu Math TeX Gyre" panose="02000503000000000000" charset="0"/>
+                            <a:cs typeface="DejaVu Math TeX Gyre" panose="02000503000000000000" charset="0"/>
+                          </a:rPr>
+                          <m:t>𝜎</m:t>
+                        </m:r>
+                      </m:e>
+                      <m:sup>
+                        <m:r>
+                          <a:rPr lang="en-US" sz="1600" i="1">
+                            <a:solidFill>
+                              <a:srgbClr val="FF0000"/>
+                            </a:solidFill>
+                            <a:latin typeface="DejaVu Math TeX Gyre" panose="02000503000000000000" charset="0"/>
+                            <a:cs typeface="DejaVu Math TeX Gyre" panose="02000503000000000000" charset="0"/>
+                          </a:rPr>
+                          <m:t>’</m:t>
+                        </m:r>
+                      </m:sup>
+                    </m:sSup>
+                  </m:oMath>
+                </a14:m>
+                <a:r>
+                  <a:rPr lang="pt-PT" altLang="en-US" sz="1600">
+                    <a:solidFill>
+                      <a:srgbClr val="FF0000"/>
+                    </a:solidFill>
+                    <a:sym typeface="+mn-ea"/>
+                  </a:rPr>
+                  <a:t> for a escolhida, confirma o </a:t>
+                </a:r>
+                <a14:m>
+                  <m:oMath xmlns:m="http://schemas.openxmlformats.org/officeDocument/2006/math">
+                    <m:sSup>
+                      <m:sSupPr>
+                        <m:ctrlPr>
+                          <a:rPr lang="en-US" sz="1600" i="1">
+                            <a:solidFill>
+                              <a:srgbClr val="FF0000"/>
+                            </a:solidFill>
+                            <a:latin typeface="DejaVu Math TeX Gyre" panose="02000503000000000000" charset="0"/>
+                            <a:cs typeface="DejaVu Math TeX Gyre" panose="02000503000000000000" charset="0"/>
+                          </a:rPr>
+                        </m:ctrlPr>
+                      </m:sSupPr>
+                      <m:e>
+                        <m:r>
+                          <a:rPr lang="en-US" sz="1600" i="1">
+                            <a:solidFill>
+                              <a:srgbClr val="FF0000"/>
+                            </a:solidFill>
+                            <a:latin typeface="DejaVu Math TeX Gyre" panose="02000503000000000000" charset="0"/>
+                            <a:cs typeface="DejaVu Math TeX Gyre" panose="02000503000000000000" charset="0"/>
+                          </a:rPr>
+                          <m:t>𝜎</m:t>
+                        </m:r>
+                      </m:e>
+                      <m:sup>
+                        <m:r>
+                          <a:rPr lang="en-US" sz="1600" i="1">
+                            <a:solidFill>
+                              <a:srgbClr val="FF0000"/>
+                            </a:solidFill>
+                            <a:latin typeface="DejaVu Math TeX Gyre" panose="02000503000000000000" charset="0"/>
+                            <a:cs typeface="DejaVu Math TeX Gyre" panose="02000503000000000000" charset="0"/>
+                          </a:rPr>
+                          <m:t>’</m:t>
+                        </m:r>
+                      </m:sup>
+                    </m:sSup>
+                  </m:oMath>
+                </a14:m>
+                <a:r>
+                  <a:rPr lang="pt-PT" altLang="en-US" sz="1600">
+                    <a:solidFill>
+                      <a:srgbClr val="FF0000"/>
+                    </a:solidFill>
+                    <a:sym typeface="+mn-ea"/>
+                  </a:rPr>
+                  <a:t> junto para ser alterado.</a:t>
+                </a:r>
+                <a:endParaRPr lang="pt-PT" altLang="en-US" sz="1600">
+                  <a:solidFill>
+                    <a:srgbClr val="FF0000"/>
+                  </a:solidFill>
+                  <a:sym typeface="+mn-ea"/>
+                </a:endParaRPr>
+              </a:p>
+            </p:txBody>
+          </p:sp>
+        </mc:Choice>
+        <mc:Fallback>
+          <p:sp>
+            <p:nvSpPr>
+              <p:cNvPr id="27" name="Text Box 26"/>
+              <p:cNvSpPr txBox="1">
+                <a:spLocks noRot="1" noChangeAspect="1" noMove="1" noResize="1" noEditPoints="1" noAdjustHandles="1" noChangeArrowheads="1" noChangeShapeType="1" noTextEdit="1"/>
+              </p:cNvSpPr>
+              <p:nvPr/>
+            </p:nvSpPr>
+            <p:spPr>
+              <a:xfrm>
+                <a:off x="2606675" y="705485"/>
+                <a:ext cx="6978650" cy="5447665"/>
+              </a:xfrm>
+              <a:prstGeom prst="rect">
+                <a:avLst/>
+              </a:prstGeom>
+              <a:blipFill rotWithShape="1">
+                <a:blip r:embed="rId1"/>
+                <a:stretch>
+                  <a:fillRect/>
+                </a:stretch>
+              </a:blipFill>
+            </p:spPr>
+            <p:txBody>
+              <a:bodyPr/>
+              <a:lstStyle/>
+              <a:p>
+                <a:r>
+                  <a:rPr lang="en-US" altLang="en-US">
+                    <a:noFill/>
+                  </a:rPr>
+                  <a:t> </a:t>
+                </a:r>
+              </a:p>
+            </p:txBody>
+          </p:sp>
+        </mc:Fallback>
+      </mc:AlternateContent>
+      <p:sp>
+        <p:nvSpPr>
+          <p:cNvPr id="2" name="Text Box 1"/>
+          <p:cNvSpPr txBox="1"/>
+          <p:nvPr/>
+        </p:nvSpPr>
+        <p:spPr>
+          <a:xfrm>
+            <a:off x="485775" y="27940"/>
+            <a:ext cx="11220450" cy="414020"/>
+          </a:xfrm>
+          <a:prstGeom prst="rect">
+            <a:avLst/>
+          </a:prstGeom>
+          <a:noFill/>
+        </p:spPr>
+        <p:txBody>
+          <a:bodyPr wrap="square" rtlCol="0">
+            <a:spAutoFit/>
+          </a:bodyPr>
+          <a:p>
+            <a:pPr lvl="0" indent="0" algn="ctr">
+              <a:lnSpc>
+                <a:spcPct val="150000"/>
+              </a:lnSpc>
+              <a:buFont typeface="Arial" panose="020B0604020202020204" pitchFamily="34" charset="0"/>
+              <a:buNone/>
+            </a:pPr>
+            <a:r>
+              <a:rPr lang="pt-PT" sz="1400" b="1">
+                <a:solidFill>
+                  <a:schemeClr val="accent2"/>
+                </a:solidFill>
+              </a:rPr>
+              <a:t>ALTERNATIVA 2</a:t>
+            </a:r>
+            <a:endParaRPr lang="pt-PT" sz="1400" b="1">
+              <a:solidFill>
+                <a:schemeClr val="accent2"/>
+              </a:solidFill>
+            </a:endParaRPr>
+          </a:p>
+        </p:txBody>
+      </p:sp>
+    </p:spTree>
+  </p:cSld>
+  <p:clrMapOvr>
+    <a:masterClrMapping/>
+  </p:clrMapOvr>
+</p:sld>
+</file>
+
 <file path=ppt/theme/theme1.xml><?xml version="1.0" encoding="utf-8"?>
 <a:theme xmlns:a="http://schemas.openxmlformats.org/drawingml/2006/main" name="Office Theme">
   <a:themeElements>

</xml_diff>